<commit_message>
Standard control name prefixes
</commit_message>
<xml_diff>
--- a/Presentation/lesson-12-winforms.pptx
+++ b/Presentation/lesson-12-winforms.pptx
@@ -5,7 +5,7 @@
     <p:sldMasterId id="2147483648" r:id="rId1"/>
   </p:sldMasterIdLst>
   <p:notesMasterIdLst>
-    <p:notesMasterId r:id="rId14"/>
+    <p:notesMasterId r:id="rId15"/>
   </p:notesMasterIdLst>
   <p:sldIdLst>
     <p:sldId id="256" r:id="rId2"/>
@@ -14,12 +14,13 @@
     <p:sldId id="281" r:id="rId5"/>
     <p:sldId id="280" r:id="rId6"/>
     <p:sldId id="283" r:id="rId7"/>
-    <p:sldId id="282" r:id="rId8"/>
-    <p:sldId id="286" r:id="rId9"/>
-    <p:sldId id="287" r:id="rId10"/>
-    <p:sldId id="288" r:id="rId11"/>
-    <p:sldId id="284" r:id="rId12"/>
-    <p:sldId id="285" r:id="rId13"/>
+    <p:sldId id="289" r:id="rId8"/>
+    <p:sldId id="282" r:id="rId9"/>
+    <p:sldId id="286" r:id="rId10"/>
+    <p:sldId id="287" r:id="rId11"/>
+    <p:sldId id="288" r:id="rId12"/>
+    <p:sldId id="284" r:id="rId13"/>
+    <p:sldId id="285" r:id="rId14"/>
   </p:sldIdLst>
   <p:sldSz cx="9144000" cy="6858000" type="screen4x3"/>
   <p:notesSz cx="6858000" cy="9144000"/>
@@ -203,7 +204,7 @@
           <a:p>
             <a:fld id="{B24A7054-7FFB-49F4-A126-5DF6E687FF53}" type="datetimeFigureOut">
               <a:rPr lang="ru-RU" smtClean="0"/>
-              <a:t>04.11.2015</a:t>
+              <a:t>09.11.2015</a:t>
             </a:fld>
             <a:endParaRPr lang="ru-RU"/>
           </a:p>
@@ -1266,7 +1267,7 @@
           <a:p>
             <a:fld id="{8E6E6A2A-E9D3-4A0D-B04A-ABDD367A1E08}" type="datetimeFigureOut">
               <a:rPr lang="ru-RU" smtClean="0"/>
-              <a:t>04.11.2015</a:t>
+              <a:t>09.11.2015</a:t>
             </a:fld>
             <a:endParaRPr lang="ru-RU"/>
           </a:p>
@@ -2714,7 +2715,7 @@
           <a:p>
             <a:fld id="{AC3D3127-B7C4-45E3-9797-C527EC9FDD78}" type="datetimeFigureOut">
               <a:rPr lang="ru-RU" smtClean="0"/>
-              <a:t>04.11.2015</a:t>
+              <a:t>09.11.2015</a:t>
             </a:fld>
             <a:endParaRPr lang="ru-RU"/>
           </a:p>
@@ -3318,11 +3319,7 @@
           <a:p>
             <a:r>
               <a:rPr lang="ru-RU" dirty="0" smtClean="0"/>
-              <a:t>Элементы </a:t>
-            </a:r>
-            <a:r>
-              <a:rPr lang="en-US" dirty="0" smtClean="0"/>
-              <a:t>UI</a:t>
+              <a:t>Статический текст</a:t>
             </a:r>
             <a:endParaRPr lang="ru-RU" dirty="0"/>
           </a:p>
@@ -3344,39 +3341,18 @@
           <a:lstStyle/>
           <a:p>
             <a:r>
-              <a:rPr lang="en-US" dirty="0" err="1" smtClean="0"/>
-              <a:t>MenuStrip</a:t>
-            </a:r>
-            <a:r>
               <a:rPr lang="en-US" dirty="0" smtClean="0"/>
-              <a:t>:</a:t>
-            </a:r>
-            <a:r>
-              <a:rPr lang="ru-RU" dirty="0" smtClean="0"/>
-              <a:t> главное меню</a:t>
+              <a:t>Label</a:t>
+            </a:r>
+          </a:p>
+          <a:p>
+            <a:r>
+              <a:rPr lang="en-US" dirty="0" err="1" smtClean="0"/>
+              <a:t>LinkLabel</a:t>
             </a:r>
             <a:endParaRPr lang="en-US" dirty="0" smtClean="0"/>
           </a:p>
           <a:p>
-            <a:r>
-              <a:rPr lang="en-US" dirty="0" err="1" smtClean="0"/>
-              <a:t>ContextMenuStrip</a:t>
-            </a:r>
-            <a:r>
-              <a:rPr lang="ru-RU" dirty="0" smtClean="0"/>
-              <a:t>: контекстное меню</a:t>
-            </a:r>
-            <a:endParaRPr lang="en-US" dirty="0" smtClean="0"/>
-          </a:p>
-          <a:p>
-            <a:r>
-              <a:rPr lang="en-US" dirty="0" err="1" smtClean="0"/>
-              <a:t>StatusStrip</a:t>
-            </a:r>
-            <a:r>
-              <a:rPr lang="ru-RU" dirty="0" smtClean="0"/>
-              <a:t>: строка статуса</a:t>
-            </a:r>
             <a:endParaRPr lang="ru-RU" dirty="0"/>
           </a:p>
         </p:txBody>
@@ -3384,7 +3360,7 @@
     </p:spTree>
     <p:extLst>
       <p:ext uri="{BB962C8B-B14F-4D97-AF65-F5344CB8AC3E}">
-        <p14:creationId xmlns:p14="http://schemas.microsoft.com/office/powerpoint/2010/main" val="3917359600"/>
+        <p14:creationId xmlns:p14="http://schemas.microsoft.com/office/powerpoint/2010/main" val="2359087904"/>
       </p:ext>
     </p:extLst>
   </p:cSld>
@@ -3428,6 +3404,116 @@
           <a:p>
             <a:r>
               <a:rPr lang="ru-RU" dirty="0" smtClean="0"/>
+              <a:t>Элементы </a:t>
+            </a:r>
+            <a:r>
+              <a:rPr lang="en-US" dirty="0" smtClean="0"/>
+              <a:t>UI</a:t>
+            </a:r>
+            <a:endParaRPr lang="ru-RU" dirty="0"/>
+          </a:p>
+        </p:txBody>
+      </p:sp>
+      <p:sp>
+        <p:nvSpPr>
+          <p:cNvPr id="3" name="Content Placeholder 2"/>
+          <p:cNvSpPr>
+            <a:spLocks noGrp="1"/>
+          </p:cNvSpPr>
+          <p:nvPr>
+            <p:ph idx="1"/>
+          </p:nvPr>
+        </p:nvSpPr>
+        <p:spPr/>
+        <p:txBody>
+          <a:bodyPr/>
+          <a:lstStyle/>
+          <a:p>
+            <a:r>
+              <a:rPr lang="en-US" dirty="0" err="1" smtClean="0"/>
+              <a:t>MenuStrip</a:t>
+            </a:r>
+            <a:r>
+              <a:rPr lang="en-US" dirty="0" smtClean="0"/>
+              <a:t>:</a:t>
+            </a:r>
+            <a:r>
+              <a:rPr lang="ru-RU" dirty="0" smtClean="0"/>
+              <a:t> главное меню</a:t>
+            </a:r>
+            <a:endParaRPr lang="en-US" dirty="0" smtClean="0"/>
+          </a:p>
+          <a:p>
+            <a:r>
+              <a:rPr lang="en-US" dirty="0" err="1" smtClean="0"/>
+              <a:t>ContextMenuStrip</a:t>
+            </a:r>
+            <a:r>
+              <a:rPr lang="ru-RU" dirty="0" smtClean="0"/>
+              <a:t>: контекстное меню</a:t>
+            </a:r>
+            <a:endParaRPr lang="en-US" dirty="0" smtClean="0"/>
+          </a:p>
+          <a:p>
+            <a:r>
+              <a:rPr lang="en-US" dirty="0" err="1" smtClean="0"/>
+              <a:t>StatusStrip</a:t>
+            </a:r>
+            <a:r>
+              <a:rPr lang="ru-RU" dirty="0" smtClean="0"/>
+              <a:t>: строка статуса</a:t>
+            </a:r>
+            <a:endParaRPr lang="ru-RU" dirty="0"/>
+          </a:p>
+        </p:txBody>
+      </p:sp>
+    </p:spTree>
+    <p:extLst>
+      <p:ext uri="{BB962C8B-B14F-4D97-AF65-F5344CB8AC3E}">
+        <p14:creationId xmlns:p14="http://schemas.microsoft.com/office/powerpoint/2010/main" val="3917359600"/>
+      </p:ext>
+    </p:extLst>
+  </p:cSld>
+  <p:clrMapOvr>
+    <a:masterClrMapping/>
+  </p:clrMapOvr>
+</p:sld>
+</file>
+
+<file path=ppt/slides/slide12.xml><?xml version="1.0" encoding="utf-8"?>
+<p:sld xmlns:a="http://schemas.openxmlformats.org/drawingml/2006/main" xmlns:r="http://schemas.openxmlformats.org/officeDocument/2006/relationships" xmlns:p="http://schemas.openxmlformats.org/presentationml/2006/main">
+  <p:cSld>
+    <p:spTree>
+      <p:nvGrpSpPr>
+        <p:cNvPr id="1" name=""/>
+        <p:cNvGrpSpPr/>
+        <p:nvPr/>
+      </p:nvGrpSpPr>
+      <p:grpSpPr>
+        <a:xfrm>
+          <a:off x="0" y="0"/>
+          <a:ext cx="0" cy="0"/>
+          <a:chOff x="0" y="0"/>
+          <a:chExt cx="0" cy="0"/>
+        </a:xfrm>
+      </p:grpSpPr>
+      <p:sp>
+        <p:nvSpPr>
+          <p:cNvPr id="2" name="Title 1"/>
+          <p:cNvSpPr>
+            <a:spLocks noGrp="1"/>
+          </p:cNvSpPr>
+          <p:nvPr>
+            <p:ph type="title"/>
+          </p:nvPr>
+        </p:nvSpPr>
+        <p:spPr/>
+        <p:txBody>
+          <a:bodyPr/>
+          <a:lstStyle/>
+          <a:p>
+            <a:r>
+              <a:rPr lang="ru-RU" dirty="0" smtClean="0"/>
               <a:t>Стандартные диалоги</a:t>
             </a:r>
             <a:endParaRPr lang="ru-RU" dirty="0"/>
@@ -3516,7 +3602,7 @@
 </p:sld>
 </file>
 
-<file path=ppt/slides/slide12.xml><?xml version="1.0" encoding="utf-8"?>
+<file path=ppt/slides/slide13.xml><?xml version="1.0" encoding="utf-8"?>
 <p:sld xmlns:a="http://schemas.openxmlformats.org/drawingml/2006/main" xmlns:r="http://schemas.openxmlformats.org/officeDocument/2006/relationships" xmlns:p="http://schemas.openxmlformats.org/presentationml/2006/main">
   <p:cSld>
     <p:spTree>
@@ -4676,7 +4762,7 @@
       </p:grpSpPr>
       <p:sp>
         <p:nvSpPr>
-          <p:cNvPr id="4" name="Title 3"/>
+          <p:cNvPr id="2" name="Title 1"/>
           <p:cNvSpPr>
             <a:spLocks noGrp="1"/>
           </p:cNvSpPr>
@@ -4691,7 +4777,7 @@
           <a:p>
             <a:r>
               <a:rPr lang="ru-RU" dirty="0" smtClean="0"/>
-              <a:t>Ввод данных</a:t>
+              <a:t>Префиксы имен</a:t>
             </a:r>
             <a:endParaRPr lang="ru-RU" dirty="0"/>
           </a:p>
@@ -4699,7 +4785,7 @@
       </p:sp>
       <p:sp>
         <p:nvSpPr>
-          <p:cNvPr id="5" name="Content Placeholder 4"/>
+          <p:cNvPr id="3" name="Content Placeholder 2"/>
           <p:cNvSpPr>
             <a:spLocks noGrp="1"/>
           </p:cNvSpPr>
@@ -4709,87 +4795,178 @@
         </p:nvSpPr>
         <p:spPr/>
         <p:txBody>
-          <a:bodyPr>
-            <a:normAutofit fontScale="92500" lnSpcReduction="20000"/>
+          <a:bodyPr numCol="2">
+            <a:normAutofit/>
           </a:bodyPr>
           <a:lstStyle/>
           <a:p>
             <a:r>
               <a:rPr lang="en-US" dirty="0" err="1" smtClean="0"/>
+              <a:t>btn</a:t>
+            </a:r>
+            <a:r>
+              <a:rPr lang="en-US" dirty="0" smtClean="0"/>
+              <a:t> – Button</a:t>
+            </a:r>
+          </a:p>
+          <a:p>
+            <a:r>
+              <a:rPr lang="en-US" dirty="0" err="1" smtClean="0"/>
+              <a:t>cb</a:t>
+            </a:r>
+            <a:r>
+              <a:rPr lang="en-US" dirty="0" smtClean="0"/>
+              <a:t> – </a:t>
+            </a:r>
+            <a:r>
+              <a:rPr lang="en-US" dirty="0" err="1" smtClean="0"/>
+              <a:t>CheckBox</a:t>
+            </a:r>
+            <a:endParaRPr lang="en-US" dirty="0" smtClean="0"/>
+          </a:p>
+          <a:p>
+            <a:r>
+              <a:rPr lang="en-US" dirty="0" err="1" smtClean="0"/>
+              <a:t>dgv</a:t>
+            </a:r>
+            <a:r>
+              <a:rPr lang="en-US" dirty="0" smtClean="0"/>
+              <a:t> – </a:t>
+            </a:r>
+            <a:r>
+              <a:rPr lang="en-US" dirty="0" err="1" smtClean="0"/>
+              <a:t>DataGridView</a:t>
+            </a:r>
+            <a:endParaRPr lang="en-US" dirty="0" smtClean="0"/>
+          </a:p>
+          <a:p>
+            <a:r>
+              <a:rPr lang="en-US" dirty="0" err="1" smtClean="0"/>
+              <a:t>gbox</a:t>
+            </a:r>
+            <a:r>
+              <a:rPr lang="en-US" dirty="0" smtClean="0"/>
+              <a:t> - </a:t>
+            </a:r>
+            <a:r>
+              <a:rPr lang="en-US" dirty="0" err="1" smtClean="0"/>
+              <a:t>GroupBox</a:t>
+            </a:r>
+            <a:endParaRPr lang="en-US" dirty="0" smtClean="0"/>
+          </a:p>
+          <a:p>
+            <a:r>
+              <a:rPr lang="en-US" dirty="0" err="1" smtClean="0"/>
+              <a:t>lbl</a:t>
+            </a:r>
+            <a:r>
+              <a:rPr lang="en-US" dirty="0" smtClean="0"/>
+              <a:t> – Label</a:t>
+            </a:r>
+          </a:p>
+          <a:p>
+            <a:r>
+              <a:rPr lang="en-US" dirty="0" err="1" smtClean="0"/>
+              <a:t>lnk</a:t>
+            </a:r>
+            <a:r>
+              <a:rPr lang="en-US" dirty="0" smtClean="0"/>
+              <a:t> – </a:t>
+            </a:r>
+            <a:r>
+              <a:rPr lang="en-US" dirty="0" err="1" smtClean="0"/>
+              <a:t>LinkLabel</a:t>
+            </a:r>
+            <a:endParaRPr lang="en-US" dirty="0" smtClean="0"/>
+          </a:p>
+          <a:p>
+            <a:r>
+              <a:rPr lang="en-US" dirty="0" smtClean="0"/>
+              <a:t>lv – </a:t>
+            </a:r>
+            <a:r>
+              <a:rPr lang="en-US" dirty="0" err="1" smtClean="0"/>
+              <a:t>ListView</a:t>
+            </a:r>
+            <a:endParaRPr lang="en-US" dirty="0" smtClean="0"/>
+          </a:p>
+          <a:p>
+            <a:r>
+              <a:rPr lang="en-US" dirty="0" err="1" smtClean="0"/>
+              <a:t>pb</a:t>
+            </a:r>
+            <a:r>
+              <a:rPr lang="en-US" dirty="0" smtClean="0"/>
+              <a:t> – </a:t>
+            </a:r>
+            <a:r>
+              <a:rPr lang="en-US" dirty="0" err="1" smtClean="0"/>
+              <a:t>PictureBox</a:t>
+            </a:r>
+            <a:endParaRPr lang="en-US" dirty="0" smtClean="0"/>
+          </a:p>
+          <a:p>
+            <a:r>
+              <a:rPr lang="en-US" dirty="0" err="1" smtClean="0"/>
+              <a:t>prgs</a:t>
+            </a:r>
+            <a:r>
+              <a:rPr lang="en-US" dirty="0" smtClean="0"/>
+              <a:t> - </a:t>
+            </a:r>
+            <a:r>
+              <a:rPr lang="en-US" dirty="0" err="1" smtClean="0"/>
+              <a:t>ProgressBar</a:t>
+            </a:r>
+            <a:endParaRPr lang="en-US" dirty="0" smtClean="0"/>
+          </a:p>
+          <a:p>
+            <a:r>
+              <a:rPr lang="en-US" dirty="0" err="1" smtClean="0"/>
+              <a:t>rb</a:t>
+            </a:r>
+            <a:r>
+              <a:rPr lang="en-US" dirty="0" smtClean="0"/>
+              <a:t> - </a:t>
+            </a:r>
+            <a:r>
+              <a:rPr lang="en-US" dirty="0" err="1" smtClean="0"/>
+              <a:t>RadioButton</a:t>
+            </a:r>
+            <a:endParaRPr lang="en-US" dirty="0" smtClean="0"/>
+          </a:p>
+          <a:p>
+            <a:r>
+              <a:rPr lang="en-US" dirty="0" err="1" smtClean="0"/>
+              <a:t>tb</a:t>
+            </a:r>
+            <a:r>
+              <a:rPr lang="en-US" dirty="0" smtClean="0"/>
+              <a:t> </a:t>
+            </a:r>
+            <a:r>
+              <a:rPr lang="ru-RU" dirty="0" smtClean="0"/>
+              <a:t>– </a:t>
+            </a:r>
+            <a:r>
+              <a:rPr lang="en-US" dirty="0" err="1" smtClean="0"/>
               <a:t>TextBox</a:t>
             </a:r>
+            <a:endParaRPr lang="en-US" dirty="0" smtClean="0"/>
+          </a:p>
+          <a:p>
+            <a:r>
+              <a:rPr lang="en-US" dirty="0" err="1" smtClean="0"/>
+              <a:t>tv</a:t>
+            </a:r>
             <a:r>
               <a:rPr lang="en-US" dirty="0" smtClean="0"/>
-              <a:t>: </a:t>
-            </a:r>
-            <a:r>
-              <a:rPr lang="ru-RU" dirty="0" smtClean="0"/>
-              <a:t>однострочный текст, пароль, многострочный текст</a:t>
-            </a:r>
-            <a:endParaRPr lang="en-US" dirty="0" smtClean="0"/>
-          </a:p>
-          <a:p>
-            <a:r>
-              <a:rPr lang="en-US" dirty="0" err="1"/>
-              <a:t>MaskedTextBox</a:t>
-            </a:r>
-            <a:endParaRPr lang="ru-RU" dirty="0" smtClean="0"/>
-          </a:p>
-          <a:p>
-            <a:r>
-              <a:rPr lang="en-US" dirty="0" err="1" smtClean="0"/>
-              <a:t>RichTextBox</a:t>
-            </a:r>
-            <a:r>
-              <a:rPr lang="ru-RU" dirty="0" smtClean="0"/>
-              <a:t>: </a:t>
-            </a:r>
-            <a:r>
-              <a:rPr lang="ru-RU" dirty="0"/>
-              <a:t>многострочный </a:t>
-            </a:r>
-            <a:r>
-              <a:rPr lang="ru-RU" dirty="0" smtClean="0"/>
-              <a:t>текст с форматированием</a:t>
-            </a:r>
-            <a:endParaRPr lang="en-US" dirty="0" smtClean="0"/>
-          </a:p>
-          <a:p>
-            <a:r>
-              <a:rPr lang="en-US" dirty="0" err="1"/>
-              <a:t>ComboBox</a:t>
-            </a:r>
-            <a:endParaRPr lang="ru-RU" dirty="0" smtClean="0"/>
-          </a:p>
-          <a:p>
-            <a:r>
-              <a:rPr lang="en-US" dirty="0" err="1" smtClean="0"/>
-              <a:t>NumericUpDown</a:t>
-            </a:r>
-            <a:endParaRPr lang="en-US" dirty="0" smtClean="0"/>
-          </a:p>
-          <a:p>
-            <a:r>
-              <a:rPr lang="en-US" dirty="0" err="1" smtClean="0"/>
-              <a:t>DomainUpDown</a:t>
-            </a:r>
-            <a:endParaRPr lang="en-US" dirty="0" smtClean="0"/>
-          </a:p>
-          <a:p>
-            <a:r>
-              <a:rPr lang="en-US" dirty="0" err="1" smtClean="0"/>
-              <a:t>DateTimePicker</a:t>
-            </a:r>
-            <a:endParaRPr lang="ru-RU" dirty="0" smtClean="0"/>
-          </a:p>
-          <a:p>
-            <a:r>
-              <a:rPr lang="en-US" dirty="0" err="1" smtClean="0"/>
-              <a:t>MonthCalendar</a:t>
-            </a:r>
-            <a:endParaRPr lang="en-US" dirty="0" smtClean="0"/>
-          </a:p>
-          <a:p>
+              <a:t> - </a:t>
+            </a:r>
+            <a:r>
+              <a:rPr lang="en-US" dirty="0" err="1" smtClean="0"/>
+              <a:t>TreeView</a:t>
+            </a:r>
             <a:endParaRPr lang="ru-RU" dirty="0"/>
           </a:p>
         </p:txBody>
@@ -4797,7 +4974,7 @@
     </p:spTree>
     <p:extLst>
       <p:ext uri="{BB962C8B-B14F-4D97-AF65-F5344CB8AC3E}">
-        <p14:creationId xmlns:p14="http://schemas.microsoft.com/office/powerpoint/2010/main" val="2778302017"/>
+        <p14:creationId xmlns:p14="http://schemas.microsoft.com/office/powerpoint/2010/main" val="3616111561"/>
       </p:ext>
     </p:extLst>
   </p:cSld>
@@ -4826,7 +5003,7 @@
       </p:grpSpPr>
       <p:sp>
         <p:nvSpPr>
-          <p:cNvPr id="2" name="Title 1"/>
+          <p:cNvPr id="4" name="Title 3"/>
           <p:cNvSpPr>
             <a:spLocks noGrp="1"/>
           </p:cNvSpPr>
@@ -4841,7 +5018,7 @@
           <a:p>
             <a:r>
               <a:rPr lang="ru-RU" dirty="0" smtClean="0"/>
-              <a:t>Контейнеры</a:t>
+              <a:t>Ввод данных</a:t>
             </a:r>
             <a:endParaRPr lang="ru-RU" dirty="0"/>
           </a:p>
@@ -4849,7 +5026,7 @@
       </p:sp>
       <p:sp>
         <p:nvSpPr>
-          <p:cNvPr id="3" name="Content Placeholder 2"/>
+          <p:cNvPr id="5" name="Content Placeholder 4"/>
           <p:cNvSpPr>
             <a:spLocks noGrp="1"/>
           </p:cNvSpPr>
@@ -4860,54 +5037,86 @@
         <p:spPr/>
         <p:txBody>
           <a:bodyPr>
-            <a:normAutofit lnSpcReduction="10000"/>
+            <a:normAutofit fontScale="92500" lnSpcReduction="20000"/>
           </a:bodyPr>
           <a:lstStyle/>
           <a:p>
             <a:r>
+              <a:rPr lang="en-US" dirty="0" err="1" smtClean="0"/>
+              <a:t>TextBox</a:t>
+            </a:r>
+            <a:r>
               <a:rPr lang="en-US" dirty="0" smtClean="0"/>
-              <a:t>Panel</a:t>
-            </a:r>
-          </a:p>
-          <a:p>
-            <a:r>
-              <a:rPr lang="en-US" dirty="0" err="1" smtClean="0"/>
-              <a:t>GroupBox</a:t>
+              <a:t>: </a:t>
+            </a:r>
+            <a:r>
+              <a:rPr lang="ru-RU" dirty="0" smtClean="0"/>
+              <a:t>однострочный текст, пароль, многострочный текст</a:t>
             </a:r>
             <a:endParaRPr lang="en-US" dirty="0" smtClean="0"/>
           </a:p>
           <a:p>
-            <a:endParaRPr lang="en-US" dirty="0"/>
-          </a:p>
-          <a:p>
-            <a:r>
-              <a:rPr lang="en-US" dirty="0" err="1" smtClean="0"/>
-              <a:t>SplitContainer</a:t>
+            <a:r>
+              <a:rPr lang="en-US" dirty="0" err="1"/>
+              <a:t>MaskedTextBox</a:t>
+            </a:r>
+            <a:endParaRPr lang="ru-RU" dirty="0" smtClean="0"/>
+          </a:p>
+          <a:p>
+            <a:r>
+              <a:rPr lang="en-US" dirty="0" err="1" smtClean="0"/>
+              <a:t>RichTextBox</a:t>
+            </a:r>
+            <a:r>
+              <a:rPr lang="ru-RU" dirty="0" smtClean="0"/>
+              <a:t>: </a:t>
+            </a:r>
+            <a:r>
+              <a:rPr lang="ru-RU" dirty="0"/>
+              <a:t>многострочный </a:t>
+            </a:r>
+            <a:r>
+              <a:rPr lang="ru-RU" dirty="0" smtClean="0"/>
+              <a:t>текст с форматированием</a:t>
             </a:r>
             <a:endParaRPr lang="en-US" dirty="0" smtClean="0"/>
           </a:p>
           <a:p>
             <a:r>
-              <a:rPr lang="en-US" dirty="0" err="1" smtClean="0"/>
-              <a:t>TabControl</a:t>
+              <a:rPr lang="en-US" dirty="0" err="1"/>
+              <a:t>ComboBox</a:t>
+            </a:r>
+            <a:endParaRPr lang="ru-RU" dirty="0" smtClean="0"/>
+          </a:p>
+          <a:p>
+            <a:r>
+              <a:rPr lang="en-US" dirty="0" err="1" smtClean="0"/>
+              <a:t>NumericUpDown</a:t>
             </a:r>
             <a:endParaRPr lang="en-US" dirty="0" smtClean="0"/>
           </a:p>
           <a:p>
-            <a:endParaRPr lang="en-US" dirty="0"/>
-          </a:p>
-          <a:p>
-            <a:r>
-              <a:rPr lang="en-US" dirty="0" err="1" smtClean="0"/>
-              <a:t>FlowLayoutPanel</a:t>
+            <a:r>
+              <a:rPr lang="en-US" dirty="0" err="1" smtClean="0"/>
+              <a:t>DomainUpDown</a:t>
             </a:r>
             <a:endParaRPr lang="en-US" dirty="0" smtClean="0"/>
           </a:p>
           <a:p>
             <a:r>
               <a:rPr lang="en-US" dirty="0" err="1" smtClean="0"/>
-              <a:t>TableLayoutPanel</a:t>
-            </a:r>
+              <a:t>DateTimePicker</a:t>
+            </a:r>
+            <a:endParaRPr lang="ru-RU" dirty="0" smtClean="0"/>
+          </a:p>
+          <a:p>
+            <a:r>
+              <a:rPr lang="en-US" dirty="0" err="1" smtClean="0"/>
+              <a:t>MonthCalendar</a:t>
+            </a:r>
+            <a:endParaRPr lang="en-US" dirty="0" smtClean="0"/>
+          </a:p>
+          <a:p>
             <a:endParaRPr lang="ru-RU" dirty="0"/>
           </a:p>
         </p:txBody>
@@ -4915,7 +5124,7 @@
     </p:spTree>
     <p:extLst>
       <p:ext uri="{BB962C8B-B14F-4D97-AF65-F5344CB8AC3E}">
-        <p14:creationId xmlns:p14="http://schemas.microsoft.com/office/powerpoint/2010/main" val="3685836777"/>
+        <p14:creationId xmlns:p14="http://schemas.microsoft.com/office/powerpoint/2010/main" val="2778302017"/>
       </p:ext>
     </p:extLst>
   </p:cSld>
@@ -4959,7 +5168,7 @@
           <a:p>
             <a:r>
               <a:rPr lang="ru-RU" dirty="0" smtClean="0"/>
-              <a:t>Статический текст</a:t>
+              <a:t>Контейнеры</a:t>
             </a:r>
             <a:endParaRPr lang="ru-RU" dirty="0"/>
           </a:p>
@@ -4977,22 +5186,55 @@
         </p:nvSpPr>
         <p:spPr/>
         <p:txBody>
-          <a:bodyPr/>
+          <a:bodyPr>
+            <a:normAutofit lnSpcReduction="10000"/>
+          </a:bodyPr>
           <a:lstStyle/>
           <a:p>
             <a:r>
               <a:rPr lang="en-US" dirty="0" smtClean="0"/>
-              <a:t>Label</a:t>
-            </a:r>
-          </a:p>
-          <a:p>
-            <a:r>
-              <a:rPr lang="en-US" dirty="0" err="1" smtClean="0"/>
-              <a:t>LinkLabel</a:t>
+              <a:t>Panel</a:t>
+            </a:r>
+          </a:p>
+          <a:p>
+            <a:r>
+              <a:rPr lang="en-US" dirty="0" err="1" smtClean="0"/>
+              <a:t>GroupBox</a:t>
             </a:r>
             <a:endParaRPr lang="en-US" dirty="0" smtClean="0"/>
           </a:p>
           <a:p>
+            <a:endParaRPr lang="en-US" dirty="0"/>
+          </a:p>
+          <a:p>
+            <a:r>
+              <a:rPr lang="en-US" dirty="0" err="1" smtClean="0"/>
+              <a:t>SplitContainer</a:t>
+            </a:r>
+            <a:endParaRPr lang="en-US" dirty="0" smtClean="0"/>
+          </a:p>
+          <a:p>
+            <a:r>
+              <a:rPr lang="en-US" dirty="0" err="1" smtClean="0"/>
+              <a:t>TabControl</a:t>
+            </a:r>
+            <a:endParaRPr lang="en-US" dirty="0" smtClean="0"/>
+          </a:p>
+          <a:p>
+            <a:endParaRPr lang="en-US" dirty="0"/>
+          </a:p>
+          <a:p>
+            <a:r>
+              <a:rPr lang="en-US" dirty="0" err="1" smtClean="0"/>
+              <a:t>FlowLayoutPanel</a:t>
+            </a:r>
+            <a:endParaRPr lang="en-US" dirty="0" smtClean="0"/>
+          </a:p>
+          <a:p>
+            <a:r>
+              <a:rPr lang="en-US" dirty="0" err="1" smtClean="0"/>
+              <a:t>TableLayoutPanel</a:t>
+            </a:r>
             <a:endParaRPr lang="ru-RU" dirty="0"/>
           </a:p>
         </p:txBody>
@@ -5000,7 +5242,7 @@
     </p:spTree>
     <p:extLst>
       <p:ext uri="{BB962C8B-B14F-4D97-AF65-F5344CB8AC3E}">
-        <p14:creationId xmlns:p14="http://schemas.microsoft.com/office/powerpoint/2010/main" val="2359087904"/>
+        <p14:creationId xmlns:p14="http://schemas.microsoft.com/office/powerpoint/2010/main" val="3685836777"/>
       </p:ext>
     </p:extLst>
   </p:cSld>

</xml_diff>

<commit_message>
Coordinate system in Windows Forms
</commit_message>
<xml_diff>
--- a/Presentation/lesson-12-winforms.pptx
+++ b/Presentation/lesson-12-winforms.pptx
@@ -5,24 +5,25 @@
     <p:sldMasterId id="2147483648" r:id="rId1"/>
   </p:sldMasterIdLst>
   <p:notesMasterIdLst>
-    <p:notesMasterId r:id="rId17"/>
+    <p:notesMasterId r:id="rId18"/>
   </p:notesMasterIdLst>
   <p:sldIdLst>
     <p:sldId id="256" r:id="rId2"/>
     <p:sldId id="264" r:id="rId3"/>
     <p:sldId id="277" r:id="rId4"/>
     <p:sldId id="281" r:id="rId5"/>
-    <p:sldId id="280" r:id="rId6"/>
-    <p:sldId id="283" r:id="rId7"/>
-    <p:sldId id="290" r:id="rId8"/>
-    <p:sldId id="291" r:id="rId9"/>
-    <p:sldId id="289" r:id="rId10"/>
-    <p:sldId id="282" r:id="rId11"/>
-    <p:sldId id="286" r:id="rId12"/>
-    <p:sldId id="287" r:id="rId13"/>
-    <p:sldId id="288" r:id="rId14"/>
-    <p:sldId id="284" r:id="rId15"/>
-    <p:sldId id="285" r:id="rId16"/>
+    <p:sldId id="292" r:id="rId6"/>
+    <p:sldId id="280" r:id="rId7"/>
+    <p:sldId id="283" r:id="rId8"/>
+    <p:sldId id="290" r:id="rId9"/>
+    <p:sldId id="291" r:id="rId10"/>
+    <p:sldId id="289" r:id="rId11"/>
+    <p:sldId id="282" r:id="rId12"/>
+    <p:sldId id="286" r:id="rId13"/>
+    <p:sldId id="287" r:id="rId14"/>
+    <p:sldId id="288" r:id="rId15"/>
+    <p:sldId id="284" r:id="rId16"/>
+    <p:sldId id="285" r:id="rId17"/>
   </p:sldIdLst>
   <p:sldSz cx="9144000" cy="6858000" type="screen4x3"/>
   <p:notesSz cx="6858000" cy="9144000"/>
@@ -206,7 +207,7 @@
           <a:p>
             <a:fld id="{B24A7054-7FFB-49F4-A126-5DF6E687FF53}" type="datetimeFigureOut">
               <a:rPr lang="ru-RU" smtClean="0"/>
-              <a:t>21.11.2015</a:t>
+              <a:t>02.12.2015</a:t>
             </a:fld>
             <a:endParaRPr lang="ru-RU"/>
           </a:p>
@@ -1269,7 +1270,7 @@
           <a:p>
             <a:fld id="{8E6E6A2A-E9D3-4A0D-B04A-ABDD367A1E08}" type="datetimeFigureOut">
               <a:rPr lang="ru-RU" smtClean="0"/>
-              <a:t>21.11.2015</a:t>
+              <a:t>02.12.2015</a:t>
             </a:fld>
             <a:endParaRPr lang="ru-RU"/>
           </a:p>
@@ -2717,7 +2718,7 @@
           <a:p>
             <a:fld id="{AC3D3127-B7C4-45E3-9797-C527EC9FDD78}" type="datetimeFigureOut">
               <a:rPr lang="ru-RU" smtClean="0"/>
-              <a:t>21.11.2015</a:t>
+              <a:t>02.12.2015</a:t>
             </a:fld>
             <a:endParaRPr lang="ru-RU"/>
           </a:p>
@@ -3306,7 +3307,7 @@
       </p:grpSpPr>
       <p:sp>
         <p:nvSpPr>
-          <p:cNvPr id="4" name="Title 3"/>
+          <p:cNvPr id="2" name="Title 1"/>
           <p:cNvSpPr>
             <a:spLocks noGrp="1"/>
           </p:cNvSpPr>
@@ -3321,7 +3322,7 @@
           <a:p>
             <a:r>
               <a:rPr lang="ru-RU" dirty="0" smtClean="0"/>
-              <a:t>Ввод данных</a:t>
+              <a:t>Префиксы имен</a:t>
             </a:r>
             <a:endParaRPr lang="ru-RU" dirty="0"/>
           </a:p>
@@ -3329,7 +3330,7 @@
       </p:sp>
       <p:sp>
         <p:nvSpPr>
-          <p:cNvPr id="5" name="Content Placeholder 4"/>
+          <p:cNvPr id="3" name="Content Placeholder 2"/>
           <p:cNvSpPr>
             <a:spLocks noGrp="1"/>
           </p:cNvSpPr>
@@ -3339,87 +3340,178 @@
         </p:nvSpPr>
         <p:spPr/>
         <p:txBody>
-          <a:bodyPr>
-            <a:normAutofit fontScale="92500" lnSpcReduction="20000"/>
+          <a:bodyPr numCol="2">
+            <a:normAutofit/>
           </a:bodyPr>
           <a:lstStyle/>
           <a:p>
             <a:r>
               <a:rPr lang="en-US" dirty="0" err="1" smtClean="0"/>
+              <a:t>btn</a:t>
+            </a:r>
+            <a:r>
+              <a:rPr lang="en-US" dirty="0" smtClean="0"/>
+              <a:t> – Button</a:t>
+            </a:r>
+          </a:p>
+          <a:p>
+            <a:r>
+              <a:rPr lang="en-US" dirty="0" err="1" smtClean="0"/>
+              <a:t>cb</a:t>
+            </a:r>
+            <a:r>
+              <a:rPr lang="en-US" dirty="0" smtClean="0"/>
+              <a:t> – </a:t>
+            </a:r>
+            <a:r>
+              <a:rPr lang="en-US" dirty="0" err="1" smtClean="0"/>
+              <a:t>CheckBox</a:t>
+            </a:r>
+            <a:endParaRPr lang="en-US" dirty="0" smtClean="0"/>
+          </a:p>
+          <a:p>
+            <a:r>
+              <a:rPr lang="en-US" dirty="0" err="1" smtClean="0"/>
+              <a:t>dgv</a:t>
+            </a:r>
+            <a:r>
+              <a:rPr lang="en-US" dirty="0" smtClean="0"/>
+              <a:t> – </a:t>
+            </a:r>
+            <a:r>
+              <a:rPr lang="en-US" dirty="0" err="1" smtClean="0"/>
+              <a:t>DataGridView</a:t>
+            </a:r>
+            <a:endParaRPr lang="en-US" dirty="0" smtClean="0"/>
+          </a:p>
+          <a:p>
+            <a:r>
+              <a:rPr lang="en-US" dirty="0" err="1" smtClean="0"/>
+              <a:t>gbox</a:t>
+            </a:r>
+            <a:r>
+              <a:rPr lang="en-US" dirty="0" smtClean="0"/>
+              <a:t> - </a:t>
+            </a:r>
+            <a:r>
+              <a:rPr lang="en-US" dirty="0" err="1" smtClean="0"/>
+              <a:t>GroupBox</a:t>
+            </a:r>
+            <a:endParaRPr lang="en-US" dirty="0" smtClean="0"/>
+          </a:p>
+          <a:p>
+            <a:r>
+              <a:rPr lang="en-US" dirty="0" err="1" smtClean="0"/>
+              <a:t>lbl</a:t>
+            </a:r>
+            <a:r>
+              <a:rPr lang="en-US" dirty="0" smtClean="0"/>
+              <a:t> – Label</a:t>
+            </a:r>
+          </a:p>
+          <a:p>
+            <a:r>
+              <a:rPr lang="en-US" dirty="0" err="1" smtClean="0"/>
+              <a:t>lnk</a:t>
+            </a:r>
+            <a:r>
+              <a:rPr lang="en-US" dirty="0" smtClean="0"/>
+              <a:t> – </a:t>
+            </a:r>
+            <a:r>
+              <a:rPr lang="en-US" dirty="0" err="1" smtClean="0"/>
+              <a:t>LinkLabel</a:t>
+            </a:r>
+            <a:endParaRPr lang="en-US" dirty="0" smtClean="0"/>
+          </a:p>
+          <a:p>
+            <a:r>
+              <a:rPr lang="en-US" dirty="0" smtClean="0"/>
+              <a:t>lv – </a:t>
+            </a:r>
+            <a:r>
+              <a:rPr lang="en-US" dirty="0" err="1" smtClean="0"/>
+              <a:t>ListView</a:t>
+            </a:r>
+            <a:endParaRPr lang="en-US" dirty="0" smtClean="0"/>
+          </a:p>
+          <a:p>
+            <a:r>
+              <a:rPr lang="en-US" dirty="0" err="1" smtClean="0"/>
+              <a:t>pb</a:t>
+            </a:r>
+            <a:r>
+              <a:rPr lang="en-US" dirty="0" smtClean="0"/>
+              <a:t> – </a:t>
+            </a:r>
+            <a:r>
+              <a:rPr lang="en-US" dirty="0" err="1" smtClean="0"/>
+              <a:t>PictureBox</a:t>
+            </a:r>
+            <a:endParaRPr lang="en-US" dirty="0" smtClean="0"/>
+          </a:p>
+          <a:p>
+            <a:r>
+              <a:rPr lang="en-US" dirty="0" err="1" smtClean="0"/>
+              <a:t>prgs</a:t>
+            </a:r>
+            <a:r>
+              <a:rPr lang="en-US" dirty="0" smtClean="0"/>
+              <a:t> - </a:t>
+            </a:r>
+            <a:r>
+              <a:rPr lang="en-US" dirty="0" err="1" smtClean="0"/>
+              <a:t>ProgressBar</a:t>
+            </a:r>
+            <a:endParaRPr lang="en-US" dirty="0" smtClean="0"/>
+          </a:p>
+          <a:p>
+            <a:r>
+              <a:rPr lang="en-US" dirty="0" err="1" smtClean="0"/>
+              <a:t>rb</a:t>
+            </a:r>
+            <a:r>
+              <a:rPr lang="en-US" dirty="0" smtClean="0"/>
+              <a:t> - </a:t>
+            </a:r>
+            <a:r>
+              <a:rPr lang="en-US" dirty="0" err="1" smtClean="0"/>
+              <a:t>RadioButton</a:t>
+            </a:r>
+            <a:endParaRPr lang="en-US" dirty="0" smtClean="0"/>
+          </a:p>
+          <a:p>
+            <a:r>
+              <a:rPr lang="en-US" dirty="0" err="1" smtClean="0"/>
+              <a:t>tb</a:t>
+            </a:r>
+            <a:r>
+              <a:rPr lang="en-US" dirty="0" smtClean="0"/>
+              <a:t> </a:t>
+            </a:r>
+            <a:r>
+              <a:rPr lang="ru-RU" dirty="0" smtClean="0"/>
+              <a:t>– </a:t>
+            </a:r>
+            <a:r>
+              <a:rPr lang="en-US" dirty="0" err="1" smtClean="0"/>
               <a:t>TextBox</a:t>
             </a:r>
+            <a:endParaRPr lang="en-US" dirty="0" smtClean="0"/>
+          </a:p>
+          <a:p>
+            <a:r>
+              <a:rPr lang="en-US" dirty="0" err="1" smtClean="0"/>
+              <a:t>tv</a:t>
+            </a:r>
             <a:r>
               <a:rPr lang="en-US" dirty="0" smtClean="0"/>
-              <a:t>: </a:t>
-            </a:r>
-            <a:r>
-              <a:rPr lang="ru-RU" dirty="0" smtClean="0"/>
-              <a:t>однострочный текст, пароль, многострочный текст</a:t>
-            </a:r>
-            <a:endParaRPr lang="en-US" dirty="0" smtClean="0"/>
-          </a:p>
-          <a:p>
-            <a:r>
-              <a:rPr lang="en-US" dirty="0" err="1"/>
-              <a:t>MaskedTextBox</a:t>
-            </a:r>
-            <a:endParaRPr lang="ru-RU" dirty="0" smtClean="0"/>
-          </a:p>
-          <a:p>
+              <a:t> - </a:t>
+            </a:r>
             <a:r>
               <a:rPr lang="en-US" dirty="0" err="1" smtClean="0"/>
-              <a:t>RichTextBox</a:t>
-            </a:r>
-            <a:r>
-              <a:rPr lang="ru-RU" dirty="0" smtClean="0"/>
-              <a:t>: </a:t>
-            </a:r>
-            <a:r>
-              <a:rPr lang="ru-RU" dirty="0"/>
-              <a:t>многострочный </a:t>
-            </a:r>
-            <a:r>
-              <a:rPr lang="ru-RU" dirty="0" smtClean="0"/>
-              <a:t>текст с форматированием</a:t>
-            </a:r>
-            <a:endParaRPr lang="en-US" dirty="0" smtClean="0"/>
-          </a:p>
-          <a:p>
-            <a:r>
-              <a:rPr lang="en-US" dirty="0" err="1"/>
-              <a:t>ComboBox</a:t>
-            </a:r>
-            <a:endParaRPr lang="ru-RU" dirty="0" smtClean="0"/>
-          </a:p>
-          <a:p>
-            <a:r>
-              <a:rPr lang="en-US" dirty="0" err="1" smtClean="0"/>
-              <a:t>NumericUpDown</a:t>
-            </a:r>
-            <a:endParaRPr lang="en-US" dirty="0" smtClean="0"/>
-          </a:p>
-          <a:p>
-            <a:r>
-              <a:rPr lang="en-US" dirty="0" err="1" smtClean="0"/>
-              <a:t>DomainUpDown</a:t>
-            </a:r>
-            <a:endParaRPr lang="en-US" dirty="0" smtClean="0"/>
-          </a:p>
-          <a:p>
-            <a:r>
-              <a:rPr lang="en-US" dirty="0" err="1" smtClean="0"/>
-              <a:t>DateTimePicker</a:t>
-            </a:r>
-            <a:endParaRPr lang="ru-RU" dirty="0" smtClean="0"/>
-          </a:p>
-          <a:p>
-            <a:r>
-              <a:rPr lang="en-US" dirty="0" err="1" smtClean="0"/>
-              <a:t>MonthCalendar</a:t>
-            </a:r>
-            <a:endParaRPr lang="en-US" dirty="0" smtClean="0"/>
-          </a:p>
-          <a:p>
+              <a:t>TreeView</a:t>
+            </a:r>
             <a:endParaRPr lang="ru-RU" dirty="0"/>
           </a:p>
         </p:txBody>
@@ -3427,7 +3519,7 @@
     </p:spTree>
     <p:extLst>
       <p:ext uri="{BB962C8B-B14F-4D97-AF65-F5344CB8AC3E}">
-        <p14:creationId xmlns:p14="http://schemas.microsoft.com/office/powerpoint/2010/main" val="2778302017"/>
+        <p14:creationId xmlns:p14="http://schemas.microsoft.com/office/powerpoint/2010/main" val="3616111561"/>
       </p:ext>
     </p:extLst>
   </p:cSld>
@@ -3456,7 +3548,7 @@
       </p:grpSpPr>
       <p:sp>
         <p:nvSpPr>
-          <p:cNvPr id="2" name="Title 1"/>
+          <p:cNvPr id="4" name="Title 3"/>
           <p:cNvSpPr>
             <a:spLocks noGrp="1"/>
           </p:cNvSpPr>
@@ -3471,7 +3563,7 @@
           <a:p>
             <a:r>
               <a:rPr lang="ru-RU" dirty="0" smtClean="0"/>
-              <a:t>Контейнеры</a:t>
+              <a:t>Ввод данных</a:t>
             </a:r>
             <a:endParaRPr lang="ru-RU" dirty="0"/>
           </a:p>
@@ -3479,7 +3571,7 @@
       </p:sp>
       <p:sp>
         <p:nvSpPr>
-          <p:cNvPr id="3" name="Content Placeholder 2"/>
+          <p:cNvPr id="5" name="Content Placeholder 4"/>
           <p:cNvSpPr>
             <a:spLocks noGrp="1"/>
           </p:cNvSpPr>
@@ -3490,54 +3582,86 @@
         <p:spPr/>
         <p:txBody>
           <a:bodyPr>
-            <a:normAutofit lnSpcReduction="10000"/>
+            <a:normAutofit fontScale="92500" lnSpcReduction="20000"/>
           </a:bodyPr>
           <a:lstStyle/>
           <a:p>
             <a:r>
+              <a:rPr lang="en-US" dirty="0" err="1" smtClean="0"/>
+              <a:t>TextBox</a:t>
+            </a:r>
+            <a:r>
               <a:rPr lang="en-US" dirty="0" smtClean="0"/>
-              <a:t>Panel</a:t>
-            </a:r>
+              <a:t>: </a:t>
+            </a:r>
+            <a:r>
+              <a:rPr lang="ru-RU" dirty="0" smtClean="0"/>
+              <a:t>однострочный текст, пароль, многострочный текст</a:t>
+            </a:r>
+            <a:endParaRPr lang="en-US" dirty="0" smtClean="0"/>
+          </a:p>
+          <a:p>
+            <a:r>
+              <a:rPr lang="en-US" dirty="0" err="1"/>
+              <a:t>MaskedTextBox</a:t>
+            </a:r>
+            <a:endParaRPr lang="ru-RU" dirty="0" smtClean="0"/>
           </a:p>
           <a:p>
             <a:r>
               <a:rPr lang="en-US" dirty="0" err="1" smtClean="0"/>
-              <a:t>GroupBox</a:t>
+              <a:t>RichTextBox</a:t>
+            </a:r>
+            <a:r>
+              <a:rPr lang="ru-RU" dirty="0" smtClean="0"/>
+              <a:t>: </a:t>
+            </a:r>
+            <a:r>
+              <a:rPr lang="ru-RU" dirty="0"/>
+              <a:t>многострочный </a:t>
+            </a:r>
+            <a:r>
+              <a:rPr lang="ru-RU" dirty="0" smtClean="0"/>
+              <a:t>текст с форматированием</a:t>
             </a:r>
             <a:endParaRPr lang="en-US" dirty="0" smtClean="0"/>
           </a:p>
           <a:p>
-            <a:endParaRPr lang="en-US" dirty="0"/>
+            <a:r>
+              <a:rPr lang="en-US" dirty="0" err="1"/>
+              <a:t>ComboBox</a:t>
+            </a:r>
+            <a:endParaRPr lang="ru-RU" dirty="0" smtClean="0"/>
           </a:p>
           <a:p>
             <a:r>
               <a:rPr lang="en-US" dirty="0" err="1" smtClean="0"/>
-              <a:t>SplitContainer</a:t>
+              <a:t>NumericUpDown</a:t>
             </a:r>
             <a:endParaRPr lang="en-US" dirty="0" smtClean="0"/>
           </a:p>
           <a:p>
             <a:r>
               <a:rPr lang="en-US" dirty="0" err="1" smtClean="0"/>
-              <a:t>TabControl</a:t>
+              <a:t>DomainUpDown</a:t>
             </a:r>
             <a:endParaRPr lang="en-US" dirty="0" smtClean="0"/>
           </a:p>
           <a:p>
-            <a:endParaRPr lang="en-US" dirty="0"/>
-          </a:p>
-          <a:p>
             <a:r>
               <a:rPr lang="en-US" dirty="0" err="1" smtClean="0"/>
-              <a:t>FlowLayoutPanel</a:t>
+              <a:t>DateTimePicker</a:t>
+            </a:r>
+            <a:endParaRPr lang="ru-RU" dirty="0" smtClean="0"/>
+          </a:p>
+          <a:p>
+            <a:r>
+              <a:rPr lang="en-US" dirty="0" err="1" smtClean="0"/>
+              <a:t>MonthCalendar</a:t>
             </a:r>
             <a:endParaRPr lang="en-US" dirty="0" smtClean="0"/>
           </a:p>
           <a:p>
-            <a:r>
-              <a:rPr lang="en-US" dirty="0" err="1" smtClean="0"/>
-              <a:t>TableLayoutPanel</a:t>
-            </a:r>
             <a:endParaRPr lang="ru-RU" dirty="0"/>
           </a:p>
         </p:txBody>
@@ -3545,7 +3669,7 @@
     </p:spTree>
     <p:extLst>
       <p:ext uri="{BB962C8B-B14F-4D97-AF65-F5344CB8AC3E}">
-        <p14:creationId xmlns:p14="http://schemas.microsoft.com/office/powerpoint/2010/main" val="3685836777"/>
+        <p14:creationId xmlns:p14="http://schemas.microsoft.com/office/powerpoint/2010/main" val="2778302017"/>
       </p:ext>
     </p:extLst>
   </p:cSld>
@@ -3589,7 +3713,7 @@
           <a:p>
             <a:r>
               <a:rPr lang="ru-RU" dirty="0" smtClean="0"/>
-              <a:t>Статический текст</a:t>
+              <a:t>Контейнеры</a:t>
             </a:r>
             <a:endParaRPr lang="ru-RU" dirty="0"/>
           </a:p>
@@ -3607,22 +3731,55 @@
         </p:nvSpPr>
         <p:spPr/>
         <p:txBody>
-          <a:bodyPr/>
+          <a:bodyPr>
+            <a:normAutofit lnSpcReduction="10000"/>
+          </a:bodyPr>
           <a:lstStyle/>
           <a:p>
             <a:r>
               <a:rPr lang="en-US" dirty="0" smtClean="0"/>
-              <a:t>Label</a:t>
+              <a:t>Panel</a:t>
             </a:r>
           </a:p>
           <a:p>
             <a:r>
               <a:rPr lang="en-US" dirty="0" err="1" smtClean="0"/>
-              <a:t>LinkLabel</a:t>
+              <a:t>GroupBox</a:t>
             </a:r>
             <a:endParaRPr lang="en-US" dirty="0" smtClean="0"/>
           </a:p>
           <a:p>
+            <a:endParaRPr lang="en-US" dirty="0"/>
+          </a:p>
+          <a:p>
+            <a:r>
+              <a:rPr lang="en-US" dirty="0" err="1" smtClean="0"/>
+              <a:t>SplitContainer</a:t>
+            </a:r>
+            <a:endParaRPr lang="en-US" dirty="0" smtClean="0"/>
+          </a:p>
+          <a:p>
+            <a:r>
+              <a:rPr lang="en-US" dirty="0" err="1" smtClean="0"/>
+              <a:t>TabControl</a:t>
+            </a:r>
+            <a:endParaRPr lang="en-US" dirty="0" smtClean="0"/>
+          </a:p>
+          <a:p>
+            <a:endParaRPr lang="en-US" dirty="0"/>
+          </a:p>
+          <a:p>
+            <a:r>
+              <a:rPr lang="en-US" dirty="0" err="1" smtClean="0"/>
+              <a:t>FlowLayoutPanel</a:t>
+            </a:r>
+            <a:endParaRPr lang="en-US" dirty="0" smtClean="0"/>
+          </a:p>
+          <a:p>
+            <a:r>
+              <a:rPr lang="en-US" dirty="0" err="1" smtClean="0"/>
+              <a:t>TableLayoutPanel</a:t>
+            </a:r>
             <a:endParaRPr lang="ru-RU" dirty="0"/>
           </a:p>
         </p:txBody>
@@ -3630,7 +3787,7 @@
     </p:spTree>
     <p:extLst>
       <p:ext uri="{BB962C8B-B14F-4D97-AF65-F5344CB8AC3E}">
-        <p14:creationId xmlns:p14="http://schemas.microsoft.com/office/powerpoint/2010/main" val="2359087904"/>
+        <p14:creationId xmlns:p14="http://schemas.microsoft.com/office/powerpoint/2010/main" val="3685836777"/>
       </p:ext>
     </p:extLst>
   </p:cSld>
@@ -3674,11 +3831,7 @@
           <a:p>
             <a:r>
               <a:rPr lang="ru-RU" dirty="0" smtClean="0"/>
-              <a:t>Элементы </a:t>
-            </a:r>
-            <a:r>
-              <a:rPr lang="en-US" dirty="0" smtClean="0"/>
-              <a:t>UI</a:t>
+              <a:t>Статический текст</a:t>
             </a:r>
             <a:endParaRPr lang="ru-RU" dirty="0"/>
           </a:p>
@@ -3700,39 +3853,18 @@
           <a:lstStyle/>
           <a:p>
             <a:r>
+              <a:rPr lang="en-US" dirty="0" smtClean="0"/>
+              <a:t>Label</a:t>
+            </a:r>
+          </a:p>
+          <a:p>
+            <a:r>
               <a:rPr lang="en-US" dirty="0" err="1" smtClean="0"/>
-              <a:t>MenuStrip</a:t>
-            </a:r>
-            <a:r>
-              <a:rPr lang="en-US" dirty="0" smtClean="0"/>
-              <a:t>:</a:t>
-            </a:r>
-            <a:r>
-              <a:rPr lang="ru-RU" dirty="0" smtClean="0"/>
-              <a:t> главное меню</a:t>
+              <a:t>LinkLabel</a:t>
             </a:r>
             <a:endParaRPr lang="en-US" dirty="0" smtClean="0"/>
           </a:p>
           <a:p>
-            <a:r>
-              <a:rPr lang="en-US" dirty="0" err="1" smtClean="0"/>
-              <a:t>ContextMenuStrip</a:t>
-            </a:r>
-            <a:r>
-              <a:rPr lang="ru-RU" dirty="0" smtClean="0"/>
-              <a:t>: контекстное меню</a:t>
-            </a:r>
-            <a:endParaRPr lang="en-US" dirty="0" smtClean="0"/>
-          </a:p>
-          <a:p>
-            <a:r>
-              <a:rPr lang="en-US" dirty="0" err="1" smtClean="0"/>
-              <a:t>StatusStrip</a:t>
-            </a:r>
-            <a:r>
-              <a:rPr lang="ru-RU" dirty="0" smtClean="0"/>
-              <a:t>: строка статуса</a:t>
-            </a:r>
             <a:endParaRPr lang="ru-RU" dirty="0"/>
           </a:p>
         </p:txBody>
@@ -3740,7 +3872,7 @@
     </p:spTree>
     <p:extLst>
       <p:ext uri="{BB962C8B-B14F-4D97-AF65-F5344CB8AC3E}">
-        <p14:creationId xmlns:p14="http://schemas.microsoft.com/office/powerpoint/2010/main" val="3917359600"/>
+        <p14:creationId xmlns:p14="http://schemas.microsoft.com/office/powerpoint/2010/main" val="2359087904"/>
       </p:ext>
     </p:extLst>
   </p:cSld>
@@ -3784,6 +3916,116 @@
           <a:p>
             <a:r>
               <a:rPr lang="ru-RU" dirty="0" smtClean="0"/>
+              <a:t>Элементы </a:t>
+            </a:r>
+            <a:r>
+              <a:rPr lang="en-US" dirty="0" smtClean="0"/>
+              <a:t>UI</a:t>
+            </a:r>
+            <a:endParaRPr lang="ru-RU" dirty="0"/>
+          </a:p>
+        </p:txBody>
+      </p:sp>
+      <p:sp>
+        <p:nvSpPr>
+          <p:cNvPr id="3" name="Content Placeholder 2"/>
+          <p:cNvSpPr>
+            <a:spLocks noGrp="1"/>
+          </p:cNvSpPr>
+          <p:nvPr>
+            <p:ph idx="1"/>
+          </p:nvPr>
+        </p:nvSpPr>
+        <p:spPr/>
+        <p:txBody>
+          <a:bodyPr/>
+          <a:lstStyle/>
+          <a:p>
+            <a:r>
+              <a:rPr lang="en-US" dirty="0" err="1" smtClean="0"/>
+              <a:t>MenuStrip</a:t>
+            </a:r>
+            <a:r>
+              <a:rPr lang="en-US" dirty="0" smtClean="0"/>
+              <a:t>:</a:t>
+            </a:r>
+            <a:r>
+              <a:rPr lang="ru-RU" dirty="0" smtClean="0"/>
+              <a:t> главное меню</a:t>
+            </a:r>
+            <a:endParaRPr lang="en-US" dirty="0" smtClean="0"/>
+          </a:p>
+          <a:p>
+            <a:r>
+              <a:rPr lang="en-US" dirty="0" err="1" smtClean="0"/>
+              <a:t>ContextMenuStrip</a:t>
+            </a:r>
+            <a:r>
+              <a:rPr lang="ru-RU" dirty="0" smtClean="0"/>
+              <a:t>: контекстное меню</a:t>
+            </a:r>
+            <a:endParaRPr lang="en-US" dirty="0" smtClean="0"/>
+          </a:p>
+          <a:p>
+            <a:r>
+              <a:rPr lang="en-US" dirty="0" err="1" smtClean="0"/>
+              <a:t>StatusStrip</a:t>
+            </a:r>
+            <a:r>
+              <a:rPr lang="ru-RU" dirty="0" smtClean="0"/>
+              <a:t>: строка статуса</a:t>
+            </a:r>
+            <a:endParaRPr lang="ru-RU" dirty="0"/>
+          </a:p>
+        </p:txBody>
+      </p:sp>
+    </p:spTree>
+    <p:extLst>
+      <p:ext uri="{BB962C8B-B14F-4D97-AF65-F5344CB8AC3E}">
+        <p14:creationId xmlns:p14="http://schemas.microsoft.com/office/powerpoint/2010/main" val="3917359600"/>
+      </p:ext>
+    </p:extLst>
+  </p:cSld>
+  <p:clrMapOvr>
+    <a:masterClrMapping/>
+  </p:clrMapOvr>
+</p:sld>
+</file>
+
+<file path=ppt/slides/slide15.xml><?xml version="1.0" encoding="utf-8"?>
+<p:sld xmlns:a="http://schemas.openxmlformats.org/drawingml/2006/main" xmlns:r="http://schemas.openxmlformats.org/officeDocument/2006/relationships" xmlns:p="http://schemas.openxmlformats.org/presentationml/2006/main">
+  <p:cSld>
+    <p:spTree>
+      <p:nvGrpSpPr>
+        <p:cNvPr id="1" name=""/>
+        <p:cNvGrpSpPr/>
+        <p:nvPr/>
+      </p:nvGrpSpPr>
+      <p:grpSpPr>
+        <a:xfrm>
+          <a:off x="0" y="0"/>
+          <a:ext cx="0" cy="0"/>
+          <a:chOff x="0" y="0"/>
+          <a:chExt cx="0" cy="0"/>
+        </a:xfrm>
+      </p:grpSpPr>
+      <p:sp>
+        <p:nvSpPr>
+          <p:cNvPr id="2" name="Title 1"/>
+          <p:cNvSpPr>
+            <a:spLocks noGrp="1"/>
+          </p:cNvSpPr>
+          <p:nvPr>
+            <p:ph type="title"/>
+          </p:nvPr>
+        </p:nvSpPr>
+        <p:spPr/>
+        <p:txBody>
+          <a:bodyPr/>
+          <a:lstStyle/>
+          <a:p>
+            <a:r>
+              <a:rPr lang="ru-RU" dirty="0" smtClean="0"/>
               <a:t>Стандартные диалоги</a:t>
             </a:r>
             <a:endParaRPr lang="ru-RU" dirty="0"/>
@@ -3872,7 +4114,7 @@
 </p:sld>
 </file>
 
-<file path=ppt/slides/slide15.xml><?xml version="1.0" encoding="utf-8"?>
+<file path=ppt/slides/slide16.xml><?xml version="1.0" encoding="utf-8"?>
 <p:sld xmlns:a="http://schemas.openxmlformats.org/drawingml/2006/main" xmlns:r="http://schemas.openxmlformats.org/officeDocument/2006/relationships" xmlns:p="http://schemas.openxmlformats.org/presentationml/2006/main">
   <p:cSld>
     <p:spTree>
@@ -4426,6 +4668,591 @@
 </file>
 
 <file path=ppt/slides/slide5.xml><?xml version="1.0" encoding="utf-8"?>
+<p:sld xmlns:a="http://schemas.openxmlformats.org/drawingml/2006/main" xmlns:r="http://schemas.openxmlformats.org/officeDocument/2006/relationships" xmlns:p="http://schemas.openxmlformats.org/presentationml/2006/main">
+  <p:cSld>
+    <p:spTree>
+      <p:nvGrpSpPr>
+        <p:cNvPr id="1" name=""/>
+        <p:cNvGrpSpPr/>
+        <p:nvPr/>
+      </p:nvGrpSpPr>
+      <p:grpSpPr>
+        <a:xfrm>
+          <a:off x="0" y="0"/>
+          <a:ext cx="0" cy="0"/>
+          <a:chOff x="0" y="0"/>
+          <a:chExt cx="0" cy="0"/>
+        </a:xfrm>
+      </p:grpSpPr>
+      <p:sp>
+        <p:nvSpPr>
+          <p:cNvPr id="4" name="Заголовок 3"/>
+          <p:cNvSpPr>
+            <a:spLocks noGrp="1"/>
+          </p:cNvSpPr>
+          <p:nvPr>
+            <p:ph type="title"/>
+          </p:nvPr>
+        </p:nvSpPr>
+        <p:spPr/>
+        <p:txBody>
+          <a:bodyPr>
+            <a:normAutofit/>
+          </a:bodyPr>
+          <a:lstStyle/>
+          <a:p>
+            <a:r>
+              <a:rPr lang="ru-RU" dirty="0" smtClean="0"/>
+              <a:t>Система координат</a:t>
+            </a:r>
+            <a:endParaRPr lang="ru-RU" dirty="0"/>
+          </a:p>
+        </p:txBody>
+      </p:sp>
+      <p:sp>
+        <p:nvSpPr>
+          <p:cNvPr id="18" name="Прямоугольник 17"/>
+          <p:cNvSpPr/>
+          <p:nvPr/>
+        </p:nvSpPr>
+        <p:spPr>
+          <a:xfrm>
+            <a:off x="1619672" y="1916832"/>
+            <a:ext cx="5328592" cy="3456384"/>
+          </a:xfrm>
+          <a:prstGeom prst="rect">
+            <a:avLst/>
+          </a:prstGeom>
+          <a:solidFill>
+            <a:schemeClr val="tx1">
+              <a:lumMod val="85000"/>
+            </a:schemeClr>
+          </a:solidFill>
+        </p:spPr>
+        <p:style>
+          <a:lnRef idx="2">
+            <a:schemeClr val="accent1">
+              <a:shade val="50000"/>
+            </a:schemeClr>
+          </a:lnRef>
+          <a:fillRef idx="1">
+            <a:schemeClr val="accent1"/>
+          </a:fillRef>
+          <a:effectRef idx="0">
+            <a:schemeClr val="accent1"/>
+          </a:effectRef>
+          <a:fontRef idx="minor">
+            <a:schemeClr val="lt1"/>
+          </a:fontRef>
+        </p:style>
+        <p:txBody>
+          <a:bodyPr rtlCol="0" anchor="ctr"/>
+          <a:lstStyle/>
+          <a:p>
+            <a:pPr algn="ctr"/>
+            <a:endParaRPr lang="ru-RU"/>
+          </a:p>
+        </p:txBody>
+      </p:sp>
+      <p:pic>
+        <p:nvPicPr>
+          <p:cNvPr id="1026" name="Picture 2"/>
+          <p:cNvPicPr>
+            <a:picLocks noChangeAspect="1" noChangeArrowheads="1"/>
+          </p:cNvPicPr>
+          <p:nvPr/>
+        </p:nvPicPr>
+        <p:blipFill>
+          <a:blip r:embed="rId2">
+            <a:extLst>
+              <a:ext uri="{28A0092B-C50C-407E-A947-70E740481C1C}">
+                <a14:useLocalDpi xmlns:a14="http://schemas.microsoft.com/office/drawing/2010/main" val="0"/>
+              </a:ext>
+            </a:extLst>
+          </a:blip>
+          <a:srcRect/>
+          <a:stretch>
+            <a:fillRect/>
+          </a:stretch>
+        </p:blipFill>
+        <p:spPr bwMode="auto">
+          <a:xfrm>
+            <a:off x="2185045" y="2265239"/>
+            <a:ext cx="3333750" cy="1895475"/>
+          </a:xfrm>
+          <a:prstGeom prst="rect">
+            <a:avLst/>
+          </a:prstGeom>
+          <a:noFill/>
+          <a:ln>
+            <a:noFill/>
+          </a:ln>
+          <a:effectLst/>
+          <a:extLst>
+            <a:ext uri="{909E8E84-426E-40DD-AFC4-6F175D3DCCD1}">
+              <a14:hiddenFill xmlns:a14="http://schemas.microsoft.com/office/drawing/2010/main">
+                <a:solidFill>
+                  <a:schemeClr val="accent1"/>
+                </a:solidFill>
+              </a14:hiddenFill>
+            </a:ext>
+            <a:ext uri="{91240B29-F687-4F45-9708-019B960494DF}">
+              <a14:hiddenLine xmlns:a14="http://schemas.microsoft.com/office/drawing/2010/main" w="9525">
+                <a:solidFill>
+                  <a:schemeClr val="tx1"/>
+                </a:solidFill>
+                <a:miter lim="800000"/>
+                <a:headEnd/>
+                <a:tailEnd/>
+              </a14:hiddenLine>
+            </a:ext>
+            <a:ext uri="{AF507438-7753-43E0-B8FC-AC1667EBCBE1}">
+              <a14:hiddenEffects xmlns:a14="http://schemas.microsoft.com/office/drawing/2010/main">
+                <a:effectLst>
+                  <a:outerShdw dist="35921" dir="2700000" algn="ctr" rotWithShape="0">
+                    <a:schemeClr val="bg2"/>
+                  </a:outerShdw>
+                </a:effectLst>
+              </a14:hiddenEffects>
+            </a:ext>
+          </a:extLst>
+        </p:spPr>
+      </p:pic>
+      <p:sp>
+        <p:nvSpPr>
+          <p:cNvPr id="8" name="Прямоугольник 7"/>
+          <p:cNvSpPr/>
+          <p:nvPr/>
+        </p:nvSpPr>
+        <p:spPr>
+          <a:xfrm>
+            <a:off x="2288952" y="2545854"/>
+            <a:ext cx="3168000" cy="1531218"/>
+          </a:xfrm>
+          <a:prstGeom prst="rect">
+            <a:avLst/>
+          </a:prstGeom>
+          <a:solidFill>
+            <a:schemeClr val="accent5">
+              <a:lumMod val="50000"/>
+            </a:schemeClr>
+          </a:solidFill>
+        </p:spPr>
+        <p:style>
+          <a:lnRef idx="2">
+            <a:schemeClr val="accent1">
+              <a:shade val="50000"/>
+            </a:schemeClr>
+          </a:lnRef>
+          <a:fillRef idx="1">
+            <a:schemeClr val="accent1"/>
+          </a:fillRef>
+          <a:effectRef idx="0">
+            <a:schemeClr val="accent1"/>
+          </a:effectRef>
+          <a:fontRef idx="minor">
+            <a:schemeClr val="lt1"/>
+          </a:fontRef>
+        </p:style>
+        <p:txBody>
+          <a:bodyPr rtlCol="0" anchor="ctr"/>
+          <a:lstStyle/>
+          <a:p>
+            <a:pPr algn="ctr"/>
+            <a:endParaRPr lang="ru-RU"/>
+          </a:p>
+        </p:txBody>
+      </p:sp>
+      <p:cxnSp>
+        <p:nvCxnSpPr>
+          <p:cNvPr id="12" name="Прямая со стрелкой 11"/>
+          <p:cNvCxnSpPr/>
+          <p:nvPr/>
+        </p:nvCxnSpPr>
+        <p:spPr>
+          <a:xfrm>
+            <a:off x="2288952" y="2545854"/>
+            <a:ext cx="3795216" cy="0"/>
+          </a:xfrm>
+          <a:prstGeom prst="straightConnector1">
+            <a:avLst/>
+          </a:prstGeom>
+          <a:ln>
+            <a:solidFill>
+              <a:srgbClr val="FF0000"/>
+            </a:solidFill>
+            <a:tailEnd type="arrow"/>
+          </a:ln>
+        </p:spPr>
+        <p:style>
+          <a:lnRef idx="1">
+            <a:schemeClr val="accent1"/>
+          </a:lnRef>
+          <a:fillRef idx="0">
+            <a:schemeClr val="accent1"/>
+          </a:fillRef>
+          <a:effectRef idx="0">
+            <a:schemeClr val="accent1"/>
+          </a:effectRef>
+          <a:fontRef idx="minor">
+            <a:schemeClr val="tx1"/>
+          </a:fontRef>
+        </p:style>
+      </p:cxnSp>
+      <p:cxnSp>
+        <p:nvCxnSpPr>
+          <p:cNvPr id="14" name="Прямая со стрелкой 13"/>
+          <p:cNvCxnSpPr/>
+          <p:nvPr/>
+        </p:nvCxnSpPr>
+        <p:spPr>
+          <a:xfrm>
+            <a:off x="2293144" y="2548012"/>
+            <a:ext cx="0" cy="2177132"/>
+          </a:xfrm>
+          <a:prstGeom prst="straightConnector1">
+            <a:avLst/>
+          </a:prstGeom>
+          <a:ln>
+            <a:solidFill>
+              <a:srgbClr val="FF0000"/>
+            </a:solidFill>
+            <a:tailEnd type="arrow"/>
+          </a:ln>
+        </p:spPr>
+        <p:style>
+          <a:lnRef idx="1">
+            <a:schemeClr val="accent1"/>
+          </a:lnRef>
+          <a:fillRef idx="0">
+            <a:schemeClr val="accent1"/>
+          </a:fillRef>
+          <a:effectRef idx="0">
+            <a:schemeClr val="accent1"/>
+          </a:effectRef>
+          <a:fontRef idx="minor">
+            <a:schemeClr val="tx1"/>
+          </a:fontRef>
+        </p:style>
+      </p:cxnSp>
+      <p:cxnSp>
+        <p:nvCxnSpPr>
+          <p:cNvPr id="20" name="Прямая со стрелкой 19"/>
+          <p:cNvCxnSpPr/>
+          <p:nvPr/>
+        </p:nvCxnSpPr>
+        <p:spPr>
+          <a:xfrm>
+            <a:off x="1612305" y="1907307"/>
+            <a:ext cx="6272063" cy="0"/>
+          </a:xfrm>
+          <a:prstGeom prst="straightConnector1">
+            <a:avLst/>
+          </a:prstGeom>
+          <a:ln>
+            <a:solidFill>
+              <a:srgbClr val="FF0000"/>
+            </a:solidFill>
+            <a:tailEnd type="arrow"/>
+          </a:ln>
+        </p:spPr>
+        <p:style>
+          <a:lnRef idx="1">
+            <a:schemeClr val="accent1"/>
+          </a:lnRef>
+          <a:fillRef idx="0">
+            <a:schemeClr val="accent1"/>
+          </a:fillRef>
+          <a:effectRef idx="0">
+            <a:schemeClr val="accent1"/>
+          </a:effectRef>
+          <a:fontRef idx="minor">
+            <a:schemeClr val="tx1"/>
+          </a:fontRef>
+        </p:style>
+      </p:cxnSp>
+      <p:cxnSp>
+        <p:nvCxnSpPr>
+          <p:cNvPr id="21" name="Прямая со стрелкой 20"/>
+          <p:cNvCxnSpPr/>
+          <p:nvPr/>
+        </p:nvCxnSpPr>
+        <p:spPr>
+          <a:xfrm>
+            <a:off x="1616497" y="1918990"/>
+            <a:ext cx="0" cy="3958282"/>
+          </a:xfrm>
+          <a:prstGeom prst="straightConnector1">
+            <a:avLst/>
+          </a:prstGeom>
+          <a:ln>
+            <a:solidFill>
+              <a:srgbClr val="FF0000"/>
+            </a:solidFill>
+            <a:tailEnd type="arrow"/>
+          </a:ln>
+        </p:spPr>
+        <p:style>
+          <a:lnRef idx="1">
+            <a:schemeClr val="accent1"/>
+          </a:lnRef>
+          <a:fillRef idx="0">
+            <a:schemeClr val="accent1"/>
+          </a:fillRef>
+          <a:effectRef idx="0">
+            <a:schemeClr val="accent1"/>
+          </a:effectRef>
+          <a:fontRef idx="minor">
+            <a:schemeClr val="tx1"/>
+          </a:fontRef>
+        </p:style>
+      </p:cxnSp>
+    </p:spTree>
+    <p:extLst>
+      <p:ext uri="{BB962C8B-B14F-4D97-AF65-F5344CB8AC3E}">
+        <p14:creationId xmlns:p14="http://schemas.microsoft.com/office/powerpoint/2010/main" val="1005109163"/>
+      </p:ext>
+    </p:extLst>
+  </p:cSld>
+  <p:clrMapOvr>
+    <a:masterClrMapping/>
+  </p:clrMapOvr>
+  <p:timing>
+    <p:tnLst>
+      <p:par>
+        <p:cTn id="1" dur="indefinite" restart="never" nodeType="tmRoot">
+          <p:childTnLst>
+            <p:seq concurrent="1" nextAc="seek">
+              <p:cTn id="2" dur="indefinite" nodeType="mainSeq">
+                <p:childTnLst>
+                  <p:par>
+                    <p:cTn id="3" fill="hold">
+                      <p:stCondLst>
+                        <p:cond delay="indefinite"/>
+                      </p:stCondLst>
+                      <p:childTnLst>
+                        <p:par>
+                          <p:cTn id="4" fill="hold">
+                            <p:stCondLst>
+                              <p:cond delay="0"/>
+                            </p:stCondLst>
+                            <p:childTnLst>
+                              <p:par>
+                                <p:cTn id="5" presetID="1" presetClass="entr" presetSubtype="0" fill="hold" nodeType="clickEffect">
+                                  <p:stCondLst>
+                                    <p:cond delay="0"/>
+                                  </p:stCondLst>
+                                  <p:childTnLst>
+                                    <p:set>
+                                      <p:cBhvr>
+                                        <p:cTn id="6" dur="1" fill="hold">
+                                          <p:stCondLst>
+                                            <p:cond delay="0"/>
+                                          </p:stCondLst>
+                                        </p:cTn>
+                                        <p:tgtEl>
+                                          <p:spTgt spid="14"/>
+                                        </p:tgtEl>
+                                        <p:attrNameLst>
+                                          <p:attrName>style.visibility</p:attrName>
+                                        </p:attrNameLst>
+                                      </p:cBhvr>
+                                      <p:to>
+                                        <p:strVal val="visible"/>
+                                      </p:to>
+                                    </p:set>
+                                  </p:childTnLst>
+                                </p:cTn>
+                              </p:par>
+                              <p:par>
+                                <p:cTn id="7" presetID="1" presetClass="entr" presetSubtype="0" fill="hold" nodeType="withEffect">
+                                  <p:stCondLst>
+                                    <p:cond delay="0"/>
+                                  </p:stCondLst>
+                                  <p:childTnLst>
+                                    <p:set>
+                                      <p:cBhvr>
+                                        <p:cTn id="8" dur="1" fill="hold">
+                                          <p:stCondLst>
+                                            <p:cond delay="0"/>
+                                          </p:stCondLst>
+                                        </p:cTn>
+                                        <p:tgtEl>
+                                          <p:spTgt spid="12"/>
+                                        </p:tgtEl>
+                                        <p:attrNameLst>
+                                          <p:attrName>style.visibility</p:attrName>
+                                        </p:attrNameLst>
+                                      </p:cBhvr>
+                                      <p:to>
+                                        <p:strVal val="visible"/>
+                                      </p:to>
+                                    </p:set>
+                                  </p:childTnLst>
+                                </p:cTn>
+                              </p:par>
+                              <p:par>
+                                <p:cTn id="9" presetID="1" presetClass="entr" presetSubtype="0" fill="hold" grpId="0" nodeType="withEffect">
+                                  <p:stCondLst>
+                                    <p:cond delay="0"/>
+                                  </p:stCondLst>
+                                  <p:childTnLst>
+                                    <p:set>
+                                      <p:cBhvr>
+                                        <p:cTn id="10" dur="1" fill="hold">
+                                          <p:stCondLst>
+                                            <p:cond delay="0"/>
+                                          </p:stCondLst>
+                                        </p:cTn>
+                                        <p:tgtEl>
+                                          <p:spTgt spid="8"/>
+                                        </p:tgtEl>
+                                        <p:attrNameLst>
+                                          <p:attrName>style.visibility</p:attrName>
+                                        </p:attrNameLst>
+                                      </p:cBhvr>
+                                      <p:to>
+                                        <p:strVal val="visible"/>
+                                      </p:to>
+                                    </p:set>
+                                  </p:childTnLst>
+                                </p:cTn>
+                              </p:par>
+                            </p:childTnLst>
+                          </p:cTn>
+                        </p:par>
+                      </p:childTnLst>
+                    </p:cTn>
+                  </p:par>
+                  <p:par>
+                    <p:cTn id="11" fill="hold">
+                      <p:stCondLst>
+                        <p:cond delay="indefinite"/>
+                      </p:stCondLst>
+                      <p:childTnLst>
+                        <p:par>
+                          <p:cTn id="12" fill="hold">
+                            <p:stCondLst>
+                              <p:cond delay="0"/>
+                            </p:stCondLst>
+                            <p:childTnLst>
+                              <p:par>
+                                <p:cTn id="13" presetID="1" presetClass="entr" presetSubtype="0" fill="hold" grpId="0" nodeType="clickEffect">
+                                  <p:stCondLst>
+                                    <p:cond delay="0"/>
+                                  </p:stCondLst>
+                                  <p:childTnLst>
+                                    <p:set>
+                                      <p:cBhvr>
+                                        <p:cTn id="14" dur="1" fill="hold">
+                                          <p:stCondLst>
+                                            <p:cond delay="0"/>
+                                          </p:stCondLst>
+                                        </p:cTn>
+                                        <p:tgtEl>
+                                          <p:spTgt spid="18"/>
+                                        </p:tgtEl>
+                                        <p:attrNameLst>
+                                          <p:attrName>style.visibility</p:attrName>
+                                        </p:attrNameLst>
+                                      </p:cBhvr>
+                                      <p:to>
+                                        <p:strVal val="visible"/>
+                                      </p:to>
+                                    </p:set>
+                                  </p:childTnLst>
+                                </p:cTn>
+                              </p:par>
+                              <p:par>
+                                <p:cTn id="15" presetID="1" presetClass="entr" presetSubtype="0" fill="hold" nodeType="withEffect">
+                                  <p:stCondLst>
+                                    <p:cond delay="0"/>
+                                  </p:stCondLst>
+                                  <p:childTnLst>
+                                    <p:set>
+                                      <p:cBhvr>
+                                        <p:cTn id="16" dur="1" fill="hold">
+                                          <p:stCondLst>
+                                            <p:cond delay="0"/>
+                                          </p:stCondLst>
+                                        </p:cTn>
+                                        <p:tgtEl>
+                                          <p:spTgt spid="21"/>
+                                        </p:tgtEl>
+                                        <p:attrNameLst>
+                                          <p:attrName>style.visibility</p:attrName>
+                                        </p:attrNameLst>
+                                      </p:cBhvr>
+                                      <p:to>
+                                        <p:strVal val="visible"/>
+                                      </p:to>
+                                    </p:set>
+                                  </p:childTnLst>
+                                </p:cTn>
+                              </p:par>
+                              <p:par>
+                                <p:cTn id="17" presetID="1" presetClass="entr" presetSubtype="0" fill="hold" nodeType="withEffect">
+                                  <p:stCondLst>
+                                    <p:cond delay="0"/>
+                                  </p:stCondLst>
+                                  <p:childTnLst>
+                                    <p:set>
+                                      <p:cBhvr>
+                                        <p:cTn id="18" dur="1" fill="hold">
+                                          <p:stCondLst>
+                                            <p:cond delay="0"/>
+                                          </p:stCondLst>
+                                        </p:cTn>
+                                        <p:tgtEl>
+                                          <p:spTgt spid="20"/>
+                                        </p:tgtEl>
+                                        <p:attrNameLst>
+                                          <p:attrName>style.visibility</p:attrName>
+                                        </p:attrNameLst>
+                                      </p:cBhvr>
+                                      <p:to>
+                                        <p:strVal val="visible"/>
+                                      </p:to>
+                                    </p:set>
+                                  </p:childTnLst>
+                                </p:cTn>
+                              </p:par>
+                            </p:childTnLst>
+                          </p:cTn>
+                        </p:par>
+                      </p:childTnLst>
+                    </p:cTn>
+                  </p:par>
+                </p:childTnLst>
+              </p:cTn>
+              <p:prevCondLst>
+                <p:cond evt="onPrev" delay="0">
+                  <p:tgtEl>
+                    <p:sldTgt/>
+                  </p:tgtEl>
+                </p:cond>
+              </p:prevCondLst>
+              <p:nextCondLst>
+                <p:cond evt="onNext" delay="0">
+                  <p:tgtEl>
+                    <p:sldTgt/>
+                  </p:tgtEl>
+                </p:cond>
+              </p:nextCondLst>
+            </p:seq>
+          </p:childTnLst>
+        </p:cTn>
+      </p:par>
+    </p:tnLst>
+    <p:bldLst>
+      <p:bldP spid="18" grpId="0" animBg="1"/>
+      <p:bldP spid="8" grpId="0" animBg="1"/>
+    </p:bldLst>
+  </p:timing>
+</p:sld>
+</file>
+
+<file path=ppt/slides/slide6.xml><?xml version="1.0" encoding="utf-8"?>
 <p:sld xmlns:a="http://schemas.openxmlformats.org/drawingml/2006/main" xmlns:r="http://schemas.openxmlformats.org/officeDocument/2006/relationships" xmlns:p="http://schemas.openxmlformats.org/presentationml/2006/main">
   <p:cSld>
     <p:spTree>
@@ -4600,419 +5427,6 @@
 </p:sld>
 </file>
 
-<file path=ppt/slides/slide6.xml><?xml version="1.0" encoding="utf-8"?>
-<p:sld xmlns:a="http://schemas.openxmlformats.org/drawingml/2006/main" xmlns:r="http://schemas.openxmlformats.org/officeDocument/2006/relationships" xmlns:p="http://schemas.openxmlformats.org/presentationml/2006/main">
-  <p:cSld>
-    <p:spTree>
-      <p:nvGrpSpPr>
-        <p:cNvPr id="1" name=""/>
-        <p:cNvGrpSpPr/>
-        <p:nvPr/>
-      </p:nvGrpSpPr>
-      <p:grpSpPr>
-        <a:xfrm>
-          <a:off x="0" y="0"/>
-          <a:ext cx="0" cy="0"/>
-          <a:chOff x="0" y="0"/>
-          <a:chExt cx="0" cy="0"/>
-        </a:xfrm>
-      </p:grpSpPr>
-      <p:sp>
-        <p:nvSpPr>
-          <p:cNvPr id="2" name="Title 1"/>
-          <p:cNvSpPr>
-            <a:spLocks noGrp="1"/>
-          </p:cNvSpPr>
-          <p:nvPr>
-            <p:ph type="title"/>
-          </p:nvPr>
-        </p:nvSpPr>
-        <p:spPr/>
-        <p:txBody>
-          <a:bodyPr/>
-          <a:lstStyle/>
-          <a:p>
-            <a:r>
-              <a:rPr lang="ru-RU" dirty="0" smtClean="0"/>
-              <a:t>Имена событий</a:t>
-            </a:r>
-            <a:endParaRPr lang="ru-RU" dirty="0"/>
-          </a:p>
-        </p:txBody>
-      </p:sp>
-      <p:sp>
-        <p:nvSpPr>
-          <p:cNvPr id="3" name="Content Placeholder 2"/>
-          <p:cNvSpPr>
-            <a:spLocks noGrp="1"/>
-          </p:cNvSpPr>
-          <p:nvPr>
-            <p:ph idx="1"/>
-          </p:nvPr>
-        </p:nvSpPr>
-        <p:spPr/>
-        <p:txBody>
-          <a:bodyPr>
-            <a:normAutofit fontScale="70000" lnSpcReduction="20000"/>
-          </a:bodyPr>
-          <a:lstStyle/>
-          <a:p>
-            <a:r>
-              <a:rPr lang="ru-RU" dirty="0"/>
-              <a:t>О</a:t>
-            </a:r>
-            <a:r>
-              <a:rPr lang="ru-RU" dirty="0" smtClean="0"/>
-              <a:t>кончание -</a:t>
-            </a:r>
-            <a:r>
-              <a:rPr lang="en-US" dirty="0" err="1" smtClean="0"/>
-              <a:t>ed</a:t>
-            </a:r>
-            <a:r>
-              <a:rPr lang="en-US" dirty="0" smtClean="0"/>
-              <a:t> </a:t>
-            </a:r>
-            <a:r>
-              <a:rPr lang="ru-RU" dirty="0" smtClean="0"/>
-              <a:t>(</a:t>
-            </a:r>
-            <a:r>
-              <a:rPr lang="en-US" dirty="0" err="1" smtClean="0"/>
-              <a:t>FormClosed</a:t>
-            </a:r>
-            <a:r>
-              <a:rPr lang="en-US" dirty="0" smtClean="0"/>
-              <a:t>, </a:t>
-            </a:r>
-            <a:r>
-              <a:rPr lang="en-US" dirty="0" err="1" smtClean="0"/>
-              <a:t>DefaultItemChanged</a:t>
-            </a:r>
-            <a:r>
-              <a:rPr lang="en-US" dirty="0" smtClean="0"/>
-              <a:t>, </a:t>
-            </a:r>
-            <a:r>
-              <a:rPr lang="en-US" dirty="0" err="1" smtClean="0"/>
-              <a:t>ItemRemoved</a:t>
-            </a:r>
-            <a:r>
-              <a:rPr lang="en-US" dirty="0" smtClean="0"/>
-              <a:t> </a:t>
-            </a:r>
-            <a:r>
-              <a:rPr lang="ru-RU" dirty="0"/>
-              <a:t>и т.п</a:t>
-            </a:r>
-            <a:r>
-              <a:rPr lang="ru-RU" dirty="0" smtClean="0"/>
-              <a:t>.):</a:t>
-            </a:r>
-            <a:r>
-              <a:rPr lang="en-US" dirty="0" smtClean="0"/>
-              <a:t> </a:t>
-            </a:r>
-            <a:r>
-              <a:rPr lang="ru-RU" dirty="0" smtClean="0"/>
-              <a:t>событие генерируется после указанного действия.</a:t>
-            </a:r>
-            <a:endParaRPr lang="en-US" dirty="0" smtClean="0"/>
-          </a:p>
-          <a:p>
-            <a:r>
-              <a:rPr lang="ru-RU" dirty="0" smtClean="0"/>
-              <a:t>Окончание –</a:t>
-            </a:r>
-            <a:r>
-              <a:rPr lang="en-US" dirty="0" err="1" smtClean="0"/>
-              <a:t>ing</a:t>
-            </a:r>
-            <a:r>
-              <a:rPr lang="ru-RU" dirty="0" smtClean="0"/>
-              <a:t> (</a:t>
-            </a:r>
-            <a:r>
-              <a:rPr lang="en-US" dirty="0" err="1" smtClean="0"/>
-              <a:t>FormClosing</a:t>
-            </a:r>
-            <a:r>
-              <a:rPr lang="en-US" dirty="0" smtClean="0"/>
-              <a:t>,</a:t>
-            </a:r>
-            <a:r>
-              <a:rPr lang="ru-RU" dirty="0" smtClean="0"/>
-              <a:t> </a:t>
-            </a:r>
-            <a:r>
-              <a:rPr lang="en-US" dirty="0" smtClean="0"/>
-              <a:t>Validating, Opening </a:t>
-            </a:r>
-            <a:r>
-              <a:rPr lang="ru-RU" dirty="0" smtClean="0"/>
-              <a:t>и т.п.): событие генерируется в момент указанного действия. Иногда дается возможность отмены.</a:t>
-            </a:r>
-          </a:p>
-          <a:p>
-            <a:r>
-              <a:rPr lang="en-US" dirty="0" err="1" smtClean="0"/>
-              <a:t>BeforeSmth</a:t>
-            </a:r>
-            <a:r>
-              <a:rPr lang="en-US" dirty="0" smtClean="0"/>
-              <a:t> </a:t>
-            </a:r>
-            <a:r>
-              <a:rPr lang="ru-RU" dirty="0" smtClean="0"/>
-              <a:t>(</a:t>
-            </a:r>
-            <a:r>
-              <a:rPr lang="en-US" dirty="0" err="1" smtClean="0"/>
-              <a:t>BeforeCollapse</a:t>
-            </a:r>
-            <a:r>
-              <a:rPr lang="en-US" dirty="0"/>
-              <a:t>, </a:t>
-            </a:r>
-            <a:r>
-              <a:rPr lang="en-US" dirty="0" err="1"/>
-              <a:t>Before</a:t>
-            </a:r>
-            <a:r>
-              <a:rPr lang="en-US" dirty="0" err="1" smtClean="0"/>
-              <a:t>Expand</a:t>
-            </a:r>
-            <a:r>
-              <a:rPr lang="en-US" dirty="0"/>
-              <a:t>, </a:t>
-            </a:r>
-            <a:r>
-              <a:rPr lang="en-US" dirty="0" err="1"/>
-              <a:t>Before</a:t>
-            </a:r>
-            <a:r>
-              <a:rPr lang="en-US" dirty="0" err="1" smtClean="0"/>
-              <a:t>LabelEdit</a:t>
-            </a:r>
-            <a:r>
-              <a:rPr lang="en-US" dirty="0" smtClean="0"/>
-              <a:t> </a:t>
-            </a:r>
-            <a:r>
-              <a:rPr lang="ru-RU" dirty="0" smtClean="0"/>
-              <a:t>и </a:t>
-            </a:r>
-            <a:r>
-              <a:rPr lang="ru-RU" dirty="0"/>
-              <a:t>т.п</a:t>
-            </a:r>
-            <a:r>
-              <a:rPr lang="ru-RU" dirty="0" smtClean="0"/>
-              <a:t>.): событие генерируется до указанного действия.</a:t>
-            </a:r>
-            <a:endParaRPr lang="en-US" dirty="0" smtClean="0"/>
-          </a:p>
-          <a:p>
-            <a:r>
-              <a:rPr lang="en-US" dirty="0" err="1" smtClean="0"/>
-              <a:t>AfterSmth</a:t>
-            </a:r>
-            <a:r>
-              <a:rPr lang="en-US" dirty="0" smtClean="0"/>
-              <a:t> </a:t>
-            </a:r>
-            <a:r>
-              <a:rPr lang="ru-RU" dirty="0" smtClean="0"/>
-              <a:t>(</a:t>
-            </a:r>
-            <a:r>
-              <a:rPr lang="en-US" dirty="0" err="1" smtClean="0"/>
-              <a:t>AfterCollapse</a:t>
-            </a:r>
-            <a:r>
-              <a:rPr lang="en-US" dirty="0" smtClean="0"/>
-              <a:t>, </a:t>
-            </a:r>
-            <a:r>
-              <a:rPr lang="en-US" dirty="0" err="1" smtClean="0"/>
-              <a:t>AfterExpand</a:t>
-            </a:r>
-            <a:r>
-              <a:rPr lang="en-US" dirty="0" smtClean="0"/>
-              <a:t>, </a:t>
-            </a:r>
-            <a:r>
-              <a:rPr lang="en-US" dirty="0" err="1" smtClean="0"/>
-              <a:t>AfterLabelEdit</a:t>
-            </a:r>
-            <a:r>
-              <a:rPr lang="en-US" dirty="0" smtClean="0"/>
-              <a:t> </a:t>
-            </a:r>
-            <a:r>
-              <a:rPr lang="ru-RU" dirty="0" smtClean="0"/>
-              <a:t>и </a:t>
-            </a:r>
-            <a:r>
-              <a:rPr lang="ru-RU" dirty="0"/>
-              <a:t>т.п</a:t>
-            </a:r>
-            <a:r>
-              <a:rPr lang="ru-RU" dirty="0" smtClean="0"/>
-              <a:t>.):</a:t>
-            </a:r>
-            <a:r>
-              <a:rPr lang="en-US" dirty="0" smtClean="0"/>
-              <a:t> </a:t>
-            </a:r>
-            <a:r>
-              <a:rPr lang="ru-RU" dirty="0"/>
-              <a:t>событие генерируется после указанного действия</a:t>
-            </a:r>
-            <a:r>
-              <a:rPr lang="ru-RU" dirty="0" smtClean="0"/>
-              <a:t>.</a:t>
-            </a:r>
-          </a:p>
-          <a:p>
-            <a:r>
-              <a:rPr lang="en-US" dirty="0" smtClean="0"/>
-              <a:t>Begin (</a:t>
-            </a:r>
-            <a:r>
-              <a:rPr lang="en-US" dirty="0" err="1" smtClean="0"/>
-              <a:t>BeginDrag</a:t>
-            </a:r>
-            <a:r>
-              <a:rPr lang="en-US" dirty="0" smtClean="0"/>
-              <a:t>, </a:t>
-            </a:r>
-            <a:r>
-              <a:rPr lang="en-US" dirty="0" err="1" smtClean="0"/>
-              <a:t>CellBeginEdit</a:t>
-            </a:r>
-            <a:r>
-              <a:rPr lang="en-US" dirty="0" smtClean="0"/>
-              <a:t>, </a:t>
-            </a:r>
-            <a:r>
-              <a:rPr lang="en-US" dirty="0" err="1" smtClean="0"/>
-              <a:t>ResizeBegin</a:t>
-            </a:r>
-            <a:r>
-              <a:rPr lang="en-US" dirty="0"/>
-              <a:t> </a:t>
-            </a:r>
-            <a:r>
-              <a:rPr lang="ru-RU" dirty="0" smtClean="0"/>
-              <a:t>и т.п.</a:t>
-            </a:r>
-            <a:r>
-              <a:rPr lang="en-US" dirty="0" smtClean="0"/>
-              <a:t>)</a:t>
-            </a:r>
-          </a:p>
-          <a:p>
-            <a:r>
-              <a:rPr lang="en-US" dirty="0" smtClean="0"/>
-              <a:t>End</a:t>
-            </a:r>
-            <a:r>
-              <a:rPr lang="ru-RU" dirty="0" smtClean="0"/>
-              <a:t> (</a:t>
-            </a:r>
-            <a:r>
-              <a:rPr lang="en-US" dirty="0" err="1" smtClean="0"/>
-              <a:t>EndDrag</a:t>
-            </a:r>
-            <a:r>
-              <a:rPr lang="en-US" dirty="0" smtClean="0"/>
-              <a:t>, </a:t>
-            </a:r>
-            <a:r>
-              <a:rPr lang="en-US" dirty="0" err="1" smtClean="0"/>
-              <a:t>CellEndEdit</a:t>
-            </a:r>
-            <a:r>
-              <a:rPr lang="en-US" dirty="0"/>
-              <a:t>, </a:t>
-            </a:r>
-            <a:r>
-              <a:rPr lang="en-US" dirty="0" err="1" smtClean="0"/>
-              <a:t>ResizeEnd</a:t>
-            </a:r>
-            <a:r>
-              <a:rPr lang="en-US" dirty="0" smtClean="0"/>
-              <a:t> </a:t>
-            </a:r>
-            <a:r>
-              <a:rPr lang="ru-RU" dirty="0"/>
-              <a:t>и т.п</a:t>
-            </a:r>
-            <a:r>
-              <a:rPr lang="ru-RU" dirty="0" smtClean="0"/>
-              <a:t>.)</a:t>
-            </a:r>
-            <a:endParaRPr lang="en-US" dirty="0" smtClean="0"/>
-          </a:p>
-          <a:p>
-            <a:r>
-              <a:rPr lang="en-US" dirty="0" err="1" smtClean="0"/>
-              <a:t>MouseXXX</a:t>
-            </a:r>
-            <a:r>
-              <a:rPr lang="ru-RU" dirty="0"/>
-              <a:t>:</a:t>
-            </a:r>
-            <a:r>
-              <a:rPr lang="en-US" dirty="0" smtClean="0"/>
-              <a:t> </a:t>
-            </a:r>
-            <a:r>
-              <a:rPr lang="ru-RU" dirty="0" smtClean="0"/>
-              <a:t>события связанные с мышью</a:t>
-            </a:r>
-          </a:p>
-          <a:p>
-            <a:r>
-              <a:rPr lang="en-US" dirty="0" err="1" smtClean="0"/>
-              <a:t>KeyXXX</a:t>
-            </a:r>
-            <a:r>
-              <a:rPr lang="en-US" dirty="0" smtClean="0"/>
-              <a:t>:</a:t>
-            </a:r>
-            <a:r>
-              <a:rPr lang="ru-RU" dirty="0"/>
-              <a:t> события связанные с </a:t>
-            </a:r>
-            <a:r>
-              <a:rPr lang="ru-RU" dirty="0" smtClean="0"/>
-              <a:t>клавиатурой</a:t>
-            </a:r>
-          </a:p>
-          <a:p>
-            <a:r>
-              <a:rPr lang="ru-RU" dirty="0" smtClean="0"/>
-              <a:t>Другие</a:t>
-            </a:r>
-            <a:endParaRPr lang="ru-RU" dirty="0"/>
-          </a:p>
-        </p:txBody>
-      </p:sp>
-    </p:spTree>
-    <p:extLst>
-      <p:ext uri="{BB962C8B-B14F-4D97-AF65-F5344CB8AC3E}">
-        <p14:creationId xmlns:p14="http://schemas.microsoft.com/office/powerpoint/2010/main" val="3606278535"/>
-      </p:ext>
-    </p:extLst>
-  </p:cSld>
-  <p:clrMapOvr>
-    <a:masterClrMapping/>
-  </p:clrMapOvr>
-</p:sld>
-</file>
-
 <file path=ppt/slides/slide7.xml><?xml version="1.0" encoding="utf-8"?>
 <p:sld xmlns:a="http://schemas.openxmlformats.org/drawingml/2006/main" xmlns:r="http://schemas.openxmlformats.org/officeDocument/2006/relationships" xmlns:p="http://schemas.openxmlformats.org/presentationml/2006/main">
   <p:cSld>
@@ -5047,79 +5461,367 @@
           <a:p>
             <a:r>
               <a:rPr lang="ru-RU" dirty="0" smtClean="0"/>
-              <a:t>Метод </a:t>
+              <a:t>Имена событий</a:t>
+            </a:r>
+            <a:endParaRPr lang="ru-RU" dirty="0"/>
+          </a:p>
+        </p:txBody>
+      </p:sp>
+      <p:sp>
+        <p:nvSpPr>
+          <p:cNvPr id="3" name="Content Placeholder 2"/>
+          <p:cNvSpPr>
+            <a:spLocks noGrp="1"/>
+          </p:cNvSpPr>
+          <p:nvPr>
+            <p:ph idx="1"/>
+          </p:nvPr>
+        </p:nvSpPr>
+        <p:spPr/>
+        <p:txBody>
+          <a:bodyPr>
+            <a:normAutofit fontScale="70000" lnSpcReduction="20000"/>
+          </a:bodyPr>
+          <a:lstStyle/>
+          <a:p>
+            <a:r>
+              <a:rPr lang="ru-RU" dirty="0"/>
+              <a:t>О</a:t>
+            </a:r>
+            <a:r>
+              <a:rPr lang="ru-RU" dirty="0" smtClean="0"/>
+              <a:t>кончание -</a:t>
+            </a:r>
+            <a:r>
+              <a:rPr lang="en-US" dirty="0" err="1" smtClean="0"/>
+              <a:t>ed</a:t>
+            </a:r>
+            <a:r>
+              <a:rPr lang="en-US" dirty="0" smtClean="0"/>
+              <a:t> </a:t>
+            </a:r>
+            <a:r>
+              <a:rPr lang="ru-RU" dirty="0" smtClean="0"/>
+              <a:t>(</a:t>
+            </a:r>
+            <a:r>
+              <a:rPr lang="en-US" dirty="0" err="1" smtClean="0"/>
+              <a:t>FormClosed</a:t>
+            </a:r>
+            <a:r>
+              <a:rPr lang="en-US" dirty="0" smtClean="0"/>
+              <a:t>, </a:t>
+            </a:r>
+            <a:r>
+              <a:rPr lang="en-US" dirty="0" err="1" smtClean="0"/>
+              <a:t>DefaultItemChanged</a:t>
+            </a:r>
+            <a:r>
+              <a:rPr lang="en-US" dirty="0" smtClean="0"/>
+              <a:t>, </a:t>
+            </a:r>
+            <a:r>
+              <a:rPr lang="en-US" dirty="0" err="1" smtClean="0"/>
+              <a:t>ItemRemoved</a:t>
+            </a:r>
+            <a:r>
+              <a:rPr lang="en-US" dirty="0" smtClean="0"/>
+              <a:t> </a:t>
+            </a:r>
+            <a:r>
+              <a:rPr lang="ru-RU" dirty="0"/>
+              <a:t>и т.п</a:t>
+            </a:r>
+            <a:r>
+              <a:rPr lang="ru-RU" dirty="0" smtClean="0"/>
+              <a:t>.):</a:t>
+            </a:r>
+            <a:r>
+              <a:rPr lang="en-US" dirty="0" smtClean="0"/>
+              <a:t> </a:t>
+            </a:r>
+            <a:r>
+              <a:rPr lang="ru-RU" dirty="0" smtClean="0"/>
+              <a:t>событие генерируется после указанного действия.</a:t>
+            </a:r>
+            <a:endParaRPr lang="en-US" dirty="0" smtClean="0"/>
+          </a:p>
+          <a:p>
+            <a:r>
+              <a:rPr lang="ru-RU" dirty="0" smtClean="0"/>
+              <a:t>Окончание –</a:t>
+            </a:r>
+            <a:r>
+              <a:rPr lang="en-US" dirty="0" err="1" smtClean="0"/>
+              <a:t>ing</a:t>
+            </a:r>
+            <a:r>
+              <a:rPr lang="ru-RU" dirty="0" smtClean="0"/>
+              <a:t> (</a:t>
+            </a:r>
+            <a:r>
+              <a:rPr lang="en-US" dirty="0" err="1" smtClean="0"/>
+              <a:t>FormClosing</a:t>
+            </a:r>
+            <a:r>
+              <a:rPr lang="en-US" dirty="0" smtClean="0"/>
+              <a:t>,</a:t>
+            </a:r>
+            <a:r>
+              <a:rPr lang="ru-RU" dirty="0" smtClean="0"/>
+              <a:t> </a:t>
+            </a:r>
+            <a:r>
+              <a:rPr lang="en-US" dirty="0" smtClean="0"/>
+              <a:t>Validating, Opening </a:t>
+            </a:r>
+            <a:r>
+              <a:rPr lang="ru-RU" dirty="0" smtClean="0"/>
+              <a:t>и т.п.): событие генерируется в момент указанного действия. Иногда дается возможность отмены.</a:t>
+            </a:r>
+          </a:p>
+          <a:p>
+            <a:r>
+              <a:rPr lang="en-US" dirty="0" err="1" smtClean="0"/>
+              <a:t>BeforeSmth</a:t>
+            </a:r>
+            <a:r>
+              <a:rPr lang="en-US" dirty="0" smtClean="0"/>
+              <a:t> </a:t>
+            </a:r>
+            <a:r>
+              <a:rPr lang="ru-RU" dirty="0" smtClean="0"/>
+              <a:t>(</a:t>
+            </a:r>
+            <a:r>
+              <a:rPr lang="en-US" dirty="0" err="1" smtClean="0"/>
+              <a:t>BeforeCollapse</a:t>
+            </a:r>
+            <a:r>
+              <a:rPr lang="en-US" dirty="0"/>
+              <a:t>, </a:t>
             </a:r>
             <a:r>
               <a:rPr lang="en-US" dirty="0" err="1"/>
-              <a:t>InitializeComponent</a:t>
-            </a:r>
-            <a:endParaRPr lang="ru-RU" dirty="0"/>
-          </a:p>
-        </p:txBody>
-      </p:sp>
-      <p:sp>
-        <p:nvSpPr>
-          <p:cNvPr id="3" name="Content Placeholder 2"/>
-          <p:cNvSpPr>
-            <a:spLocks noGrp="1"/>
-          </p:cNvSpPr>
-          <p:nvPr>
-            <p:ph idx="1"/>
-          </p:nvPr>
-        </p:nvSpPr>
-        <p:spPr/>
-        <p:txBody>
-          <a:bodyPr/>
-          <a:lstStyle/>
-          <a:p>
-            <a:pPr marL="0" indent="0">
-              <a:buNone/>
-            </a:pPr>
+              <a:t>Before</a:t>
+            </a:r>
+            <a:r>
+              <a:rPr lang="en-US" dirty="0" err="1" smtClean="0"/>
+              <a:t>Expand</a:t>
+            </a:r>
+            <a:r>
+              <a:rPr lang="en-US" dirty="0"/>
+              <a:t>, </a:t>
+            </a:r>
+            <a:r>
+              <a:rPr lang="en-US" dirty="0" err="1"/>
+              <a:t>Before</a:t>
+            </a:r>
+            <a:r>
+              <a:rPr lang="en-US" dirty="0" err="1" smtClean="0"/>
+              <a:t>LabelEdit</a:t>
+            </a:r>
+            <a:r>
+              <a:rPr lang="en-US" dirty="0" smtClean="0"/>
+              <a:t> </a:t>
+            </a:r>
             <a:r>
               <a:rPr lang="ru-RU" dirty="0" smtClean="0"/>
-              <a:t>Метод </a:t>
-            </a:r>
+              <a:t>и </a:t>
+            </a:r>
+            <a:r>
+              <a:rPr lang="ru-RU" dirty="0"/>
+              <a:t>т.п</a:t>
+            </a:r>
+            <a:r>
+              <a:rPr lang="ru-RU" dirty="0" smtClean="0"/>
+              <a:t>.): событие генерируется до указанного действия.</a:t>
+            </a:r>
+            <a:endParaRPr lang="en-US" dirty="0" smtClean="0"/>
+          </a:p>
+          <a:p>
             <a:r>
               <a:rPr lang="en-US" dirty="0" err="1" smtClean="0"/>
-              <a:t>InitializeComponent</a:t>
+              <a:t>AfterSmth</a:t>
+            </a:r>
+            <a:r>
+              <a:rPr lang="en-US" dirty="0" smtClean="0"/>
+              <a:t> </a:t>
             </a:r>
             <a:r>
               <a:rPr lang="ru-RU" dirty="0" smtClean="0"/>
-              <a:t> используется дизайнером </a:t>
+              <a:t>(</a:t>
+            </a:r>
+            <a:r>
+              <a:rPr lang="en-US" dirty="0" err="1" smtClean="0"/>
+              <a:t>AfterCollapse</a:t>
             </a:r>
             <a:r>
               <a:rPr lang="en-US" dirty="0" smtClean="0"/>
-              <a:t>Visual Studio.</a:t>
-            </a:r>
-          </a:p>
-          <a:p>
+              <a:t>, </a:t>
+            </a:r>
+            <a:r>
+              <a:rPr lang="en-US" dirty="0" err="1" smtClean="0"/>
+              <a:t>AfterExpand</a:t>
+            </a:r>
+            <a:r>
+              <a:rPr lang="en-US" dirty="0" smtClean="0"/>
+              <a:t>, </a:t>
+            </a:r>
+            <a:r>
+              <a:rPr lang="en-US" dirty="0" err="1" smtClean="0"/>
+              <a:t>AfterLabelEdit</a:t>
+            </a:r>
+            <a:r>
+              <a:rPr lang="en-US" dirty="0" smtClean="0"/>
+              <a:t> </a:t>
+            </a:r>
             <a:r>
               <a:rPr lang="ru-RU" dirty="0" smtClean="0"/>
-              <a:t>Не меняйте этот метод</a:t>
-            </a:r>
-          </a:p>
-          <a:p>
+              <a:t>и </a:t>
+            </a:r>
+            <a:r>
+              <a:rPr lang="ru-RU" dirty="0"/>
+              <a:t>т.п</a:t>
+            </a:r>
             <a:r>
               <a:rPr lang="ru-RU" dirty="0" smtClean="0"/>
-              <a:t>Не удаляйте вызов </a:t>
+              <a:t>.):</a:t>
+            </a:r>
+            <a:r>
+              <a:rPr lang="en-US" dirty="0" smtClean="0"/>
+              <a:t> </a:t>
+            </a:r>
+            <a:r>
+              <a:rPr lang="ru-RU" dirty="0"/>
+              <a:t>событие генерируется после указанного действия</a:t>
+            </a:r>
+            <a:r>
+              <a:rPr lang="ru-RU" dirty="0" smtClean="0"/>
+              <a:t>.</a:t>
+            </a:r>
+          </a:p>
+          <a:p>
+            <a:r>
+              <a:rPr lang="en-US" dirty="0" smtClean="0"/>
+              <a:t>Begin (</a:t>
             </a:r>
             <a:r>
               <a:rPr lang="en-US" dirty="0" err="1" smtClean="0"/>
-              <a:t>InitializeComponent</a:t>
+              <a:t>BeginDrag</a:t>
+            </a:r>
+            <a:r>
+              <a:rPr lang="en-US" dirty="0" smtClean="0"/>
+              <a:t>, </a:t>
+            </a:r>
+            <a:r>
+              <a:rPr lang="en-US" dirty="0" err="1" smtClean="0"/>
+              <a:t>CellBeginEdit</a:t>
+            </a:r>
+            <a:r>
+              <a:rPr lang="en-US" dirty="0" smtClean="0"/>
+              <a:t>, </a:t>
+            </a:r>
+            <a:r>
+              <a:rPr lang="en-US" dirty="0" err="1" smtClean="0"/>
+              <a:t>ResizeBegin</a:t>
+            </a:r>
+            <a:r>
+              <a:rPr lang="en-US" dirty="0"/>
+              <a:t> </a:t>
             </a:r>
             <a:r>
               <a:rPr lang="ru-RU" dirty="0" smtClean="0"/>
-              <a:t> из конструктора формы</a:t>
-            </a:r>
-          </a:p>
-          <a:p>
+              <a:t>и т.п.</a:t>
+            </a:r>
+            <a:r>
+              <a:rPr lang="en-US" dirty="0" smtClean="0"/>
+              <a:t>)</a:t>
+            </a:r>
+          </a:p>
+          <a:p>
+            <a:r>
+              <a:rPr lang="en-US" dirty="0" smtClean="0"/>
+              <a:t>End</a:t>
+            </a:r>
             <a:r>
               <a:rPr lang="ru-RU" dirty="0" smtClean="0"/>
-              <a:t>Пишите свой код инициализации после </a:t>
-            </a:r>
-            <a:r>
-              <a:rPr lang="en-US" dirty="0" err="1"/>
-              <a:t>InitializeComponent</a:t>
+              <a:t> (</a:t>
+            </a:r>
+            <a:r>
+              <a:rPr lang="en-US" dirty="0" err="1" smtClean="0"/>
+              <a:t>EndDrag</a:t>
+            </a:r>
+            <a:r>
+              <a:rPr lang="en-US" dirty="0" smtClean="0"/>
+              <a:t>, </a:t>
+            </a:r>
+            <a:r>
+              <a:rPr lang="en-US" dirty="0" err="1" smtClean="0"/>
+              <a:t>CellEndEdit</a:t>
+            </a:r>
+            <a:r>
+              <a:rPr lang="en-US" dirty="0"/>
+              <a:t>, </a:t>
+            </a:r>
+            <a:r>
+              <a:rPr lang="en-US" dirty="0" err="1" smtClean="0"/>
+              <a:t>ResizeEnd</a:t>
+            </a:r>
+            <a:r>
+              <a:rPr lang="en-US" dirty="0" smtClean="0"/>
+              <a:t> </a:t>
+            </a:r>
+            <a:r>
+              <a:rPr lang="ru-RU" dirty="0"/>
+              <a:t>и т.п</a:t>
+            </a:r>
+            <a:r>
+              <a:rPr lang="ru-RU" dirty="0" smtClean="0"/>
+              <a:t>.)</a:t>
+            </a:r>
+            <a:endParaRPr lang="en-US" dirty="0" smtClean="0"/>
+          </a:p>
+          <a:p>
+            <a:r>
+              <a:rPr lang="en-US" dirty="0" err="1" smtClean="0"/>
+              <a:t>MouseXXX</a:t>
+            </a:r>
+            <a:r>
+              <a:rPr lang="ru-RU" dirty="0"/>
+              <a:t>:</a:t>
+            </a:r>
+            <a:r>
+              <a:rPr lang="en-US" dirty="0" smtClean="0"/>
+              <a:t> </a:t>
+            </a:r>
+            <a:r>
+              <a:rPr lang="ru-RU" dirty="0" smtClean="0"/>
+              <a:t>события связанные с мышью</a:t>
+            </a:r>
+          </a:p>
+          <a:p>
+            <a:r>
+              <a:rPr lang="en-US" dirty="0" err="1" smtClean="0"/>
+              <a:t>KeyXXX</a:t>
+            </a:r>
+            <a:r>
+              <a:rPr lang="en-US" dirty="0" smtClean="0"/>
+              <a:t>:</a:t>
+            </a:r>
+            <a:r>
+              <a:rPr lang="ru-RU" dirty="0"/>
+              <a:t> события связанные с </a:t>
+            </a:r>
+            <a:r>
+              <a:rPr lang="ru-RU" dirty="0" smtClean="0"/>
+              <a:t>клавиатурой</a:t>
+            </a:r>
+          </a:p>
+          <a:p>
+            <a:r>
+              <a:rPr lang="ru-RU" dirty="0" smtClean="0"/>
+              <a:t>Другие</a:t>
             </a:r>
             <a:endParaRPr lang="ru-RU" dirty="0"/>
           </a:p>
@@ -5128,7 +5830,7 @@
     </p:spTree>
     <p:extLst>
       <p:ext uri="{BB962C8B-B14F-4D97-AF65-F5344CB8AC3E}">
-        <p14:creationId xmlns:p14="http://schemas.microsoft.com/office/powerpoint/2010/main" val="4026839946"/>
+        <p14:creationId xmlns:p14="http://schemas.microsoft.com/office/powerpoint/2010/main" val="3606278535"/>
       </p:ext>
     </p:extLst>
   </p:cSld>
@@ -5172,15 +5874,11 @@
           <a:p>
             <a:r>
               <a:rPr lang="ru-RU" dirty="0" smtClean="0"/>
-              <a:t>Окно «</a:t>
-            </a:r>
-            <a:r>
-              <a:rPr lang="en-US" dirty="0" smtClean="0"/>
-              <a:t>Properties</a:t>
-            </a:r>
-            <a:r>
-              <a:rPr lang="ru-RU" dirty="0" smtClean="0"/>
-              <a:t>»</a:t>
+              <a:t>Метод </a:t>
+            </a:r>
+            <a:r>
+              <a:rPr lang="en-US" dirty="0" err="1"/>
+              <a:t>InitializeComponent</a:t>
             </a:r>
             <a:endParaRPr lang="ru-RU" dirty="0"/>
           </a:p>
@@ -5201,26 +5899,54 @@
           <a:bodyPr/>
           <a:lstStyle/>
           <a:p>
+            <a:pPr marL="0" indent="0">
+              <a:buNone/>
+            </a:pPr>
             <a:r>
               <a:rPr lang="ru-RU" dirty="0" smtClean="0"/>
-              <a:t>(</a:t>
+              <a:t>Метод </a:t>
+            </a:r>
+            <a:r>
+              <a:rPr lang="en-US" dirty="0" err="1" smtClean="0"/>
+              <a:t>InitializeComponent</a:t>
+            </a:r>
+            <a:r>
+              <a:rPr lang="ru-RU" dirty="0" smtClean="0"/>
+              <a:t> используется дизайнером </a:t>
             </a:r>
             <a:r>
               <a:rPr lang="en-US" dirty="0" smtClean="0"/>
-              <a:t>Name)</a:t>
-            </a:r>
-          </a:p>
-          <a:p>
+              <a:t>Visual Studio.</a:t>
+            </a:r>
+          </a:p>
+          <a:p>
+            <a:r>
+              <a:rPr lang="ru-RU" dirty="0" smtClean="0"/>
+              <a:t>Не меняйте этот метод</a:t>
+            </a:r>
+          </a:p>
+          <a:p>
+            <a:r>
+              <a:rPr lang="ru-RU" dirty="0" smtClean="0"/>
+              <a:t>Не удаляйте вызов </a:t>
+            </a:r>
             <a:r>
               <a:rPr lang="en-US" dirty="0" err="1" smtClean="0"/>
-              <a:t>GenerateMember</a:t>
-            </a:r>
-            <a:endParaRPr lang="en-US" dirty="0" smtClean="0"/>
-          </a:p>
-          <a:p>
-            <a:r>
-              <a:rPr lang="en-US" dirty="0" smtClean="0"/>
-              <a:t>Modifiers</a:t>
+              <a:t>InitializeComponent</a:t>
+            </a:r>
+            <a:r>
+              <a:rPr lang="ru-RU" dirty="0" smtClean="0"/>
+              <a:t> из конструктора формы</a:t>
+            </a:r>
+          </a:p>
+          <a:p>
+            <a:r>
+              <a:rPr lang="ru-RU" dirty="0" smtClean="0"/>
+              <a:t>Пишите свой код инициализации после </a:t>
+            </a:r>
+            <a:r>
+              <a:rPr lang="en-US" dirty="0" err="1"/>
+              <a:t>InitializeComponent</a:t>
             </a:r>
             <a:endParaRPr lang="ru-RU" dirty="0"/>
           </a:p>
@@ -5229,7 +5955,7 @@
     </p:spTree>
     <p:extLst>
       <p:ext uri="{BB962C8B-B14F-4D97-AF65-F5344CB8AC3E}">
-        <p14:creationId xmlns:p14="http://schemas.microsoft.com/office/powerpoint/2010/main" val="3812283606"/>
+        <p14:creationId xmlns:p14="http://schemas.microsoft.com/office/powerpoint/2010/main" val="4026839946"/>
       </p:ext>
     </p:extLst>
   </p:cSld>
@@ -5273,7 +5999,15 @@
           <a:p>
             <a:r>
               <a:rPr lang="ru-RU" dirty="0" smtClean="0"/>
-              <a:t>Префиксы имен</a:t>
+              <a:t>Окно «</a:t>
+            </a:r>
+            <a:r>
+              <a:rPr lang="en-US" dirty="0" smtClean="0"/>
+              <a:t>Properties</a:t>
+            </a:r>
+            <a:r>
+              <a:rPr lang="ru-RU" dirty="0" smtClean="0"/>
+              <a:t>»</a:t>
             </a:r>
             <a:endParaRPr lang="ru-RU" dirty="0"/>
           </a:p>
@@ -5291,177 +6025,29 @@
         </p:nvSpPr>
         <p:spPr/>
         <p:txBody>
-          <a:bodyPr numCol="2">
-            <a:normAutofit/>
-          </a:bodyPr>
+          <a:bodyPr/>
           <a:lstStyle/>
           <a:p>
             <a:r>
+              <a:rPr lang="ru-RU" dirty="0" smtClean="0"/>
+              <a:t>(</a:t>
+            </a:r>
+            <a:r>
+              <a:rPr lang="en-US" dirty="0" smtClean="0"/>
+              <a:t>Name)</a:t>
+            </a:r>
+          </a:p>
+          <a:p>
+            <a:r>
               <a:rPr lang="en-US" dirty="0" err="1" smtClean="0"/>
-              <a:t>btn</a:t>
-            </a:r>
+              <a:t>GenerateMember</a:t>
+            </a:r>
+            <a:endParaRPr lang="en-US" dirty="0" smtClean="0"/>
+          </a:p>
+          <a:p>
             <a:r>
               <a:rPr lang="en-US" dirty="0" smtClean="0"/>
-              <a:t> – Button</a:t>
-            </a:r>
-          </a:p>
-          <a:p>
-            <a:r>
-              <a:rPr lang="en-US" dirty="0" err="1" smtClean="0"/>
-              <a:t>cb</a:t>
-            </a:r>
-            <a:r>
-              <a:rPr lang="en-US" dirty="0" smtClean="0"/>
-              <a:t> – </a:t>
-            </a:r>
-            <a:r>
-              <a:rPr lang="en-US" dirty="0" err="1" smtClean="0"/>
-              <a:t>CheckBox</a:t>
-            </a:r>
-            <a:endParaRPr lang="en-US" dirty="0" smtClean="0"/>
-          </a:p>
-          <a:p>
-            <a:r>
-              <a:rPr lang="en-US" dirty="0" err="1" smtClean="0"/>
-              <a:t>dgv</a:t>
-            </a:r>
-            <a:r>
-              <a:rPr lang="en-US" dirty="0" smtClean="0"/>
-              <a:t> – </a:t>
-            </a:r>
-            <a:r>
-              <a:rPr lang="en-US" dirty="0" err="1" smtClean="0"/>
-              <a:t>DataGridView</a:t>
-            </a:r>
-            <a:endParaRPr lang="en-US" dirty="0" smtClean="0"/>
-          </a:p>
-          <a:p>
-            <a:r>
-              <a:rPr lang="en-US" dirty="0" err="1" smtClean="0"/>
-              <a:t>gbox</a:t>
-            </a:r>
-            <a:r>
-              <a:rPr lang="en-US" dirty="0" smtClean="0"/>
-              <a:t> - </a:t>
-            </a:r>
-            <a:r>
-              <a:rPr lang="en-US" dirty="0" err="1" smtClean="0"/>
-              <a:t>GroupBox</a:t>
-            </a:r>
-            <a:endParaRPr lang="en-US" dirty="0" smtClean="0"/>
-          </a:p>
-          <a:p>
-            <a:r>
-              <a:rPr lang="en-US" dirty="0" err="1" smtClean="0"/>
-              <a:t>lbl</a:t>
-            </a:r>
-            <a:r>
-              <a:rPr lang="en-US" dirty="0" smtClean="0"/>
-              <a:t> – Label</a:t>
-            </a:r>
-          </a:p>
-          <a:p>
-            <a:r>
-              <a:rPr lang="en-US" dirty="0" err="1" smtClean="0"/>
-              <a:t>lnk</a:t>
-            </a:r>
-            <a:r>
-              <a:rPr lang="en-US" dirty="0" smtClean="0"/>
-              <a:t> – </a:t>
-            </a:r>
-            <a:r>
-              <a:rPr lang="en-US" dirty="0" err="1" smtClean="0"/>
-              <a:t>LinkLabel</a:t>
-            </a:r>
-            <a:endParaRPr lang="en-US" dirty="0" smtClean="0"/>
-          </a:p>
-          <a:p>
-            <a:r>
-              <a:rPr lang="en-US" dirty="0" smtClean="0"/>
-              <a:t>lv – </a:t>
-            </a:r>
-            <a:r>
-              <a:rPr lang="en-US" dirty="0" err="1" smtClean="0"/>
-              <a:t>ListView</a:t>
-            </a:r>
-            <a:endParaRPr lang="en-US" dirty="0" smtClean="0"/>
-          </a:p>
-          <a:p>
-            <a:r>
-              <a:rPr lang="en-US" dirty="0" err="1" smtClean="0"/>
-              <a:t>pb</a:t>
-            </a:r>
-            <a:r>
-              <a:rPr lang="en-US" dirty="0" smtClean="0"/>
-              <a:t> – </a:t>
-            </a:r>
-            <a:r>
-              <a:rPr lang="en-US" dirty="0" err="1" smtClean="0"/>
-              <a:t>PictureBox</a:t>
-            </a:r>
-            <a:endParaRPr lang="en-US" dirty="0" smtClean="0"/>
-          </a:p>
-          <a:p>
-            <a:r>
-              <a:rPr lang="en-US" dirty="0" err="1" smtClean="0"/>
-              <a:t>prgs</a:t>
-            </a:r>
-            <a:r>
-              <a:rPr lang="en-US" dirty="0" smtClean="0"/>
-              <a:t> - </a:t>
-            </a:r>
-            <a:r>
-              <a:rPr lang="en-US" dirty="0" err="1" smtClean="0"/>
-              <a:t>ProgressBar</a:t>
-            </a:r>
-            <a:endParaRPr lang="en-US" dirty="0" smtClean="0"/>
-          </a:p>
-          <a:p>
-            <a:r>
-              <a:rPr lang="en-US" dirty="0" err="1" smtClean="0"/>
-              <a:t>rb</a:t>
-            </a:r>
-            <a:r>
-              <a:rPr lang="en-US" dirty="0" smtClean="0"/>
-              <a:t> - </a:t>
-            </a:r>
-            <a:r>
-              <a:rPr lang="en-US" dirty="0" err="1" smtClean="0"/>
-              <a:t>RadioButton</a:t>
-            </a:r>
-            <a:endParaRPr lang="en-US" dirty="0" smtClean="0"/>
-          </a:p>
-          <a:p>
-            <a:r>
-              <a:rPr lang="en-US" dirty="0" err="1" smtClean="0"/>
-              <a:t>tb</a:t>
-            </a:r>
-            <a:r>
-              <a:rPr lang="en-US" dirty="0" smtClean="0"/>
-              <a:t> </a:t>
-            </a:r>
-            <a:r>
-              <a:rPr lang="ru-RU" dirty="0" smtClean="0"/>
-              <a:t>– </a:t>
-            </a:r>
-            <a:r>
-              <a:rPr lang="en-US" dirty="0" err="1" smtClean="0"/>
-              <a:t>TextBox</a:t>
-            </a:r>
-            <a:endParaRPr lang="en-US" dirty="0" smtClean="0"/>
-          </a:p>
-          <a:p>
-            <a:r>
-              <a:rPr lang="en-US" dirty="0" err="1" smtClean="0"/>
-              <a:t>tv</a:t>
-            </a:r>
-            <a:r>
-              <a:rPr lang="en-US" dirty="0" smtClean="0"/>
-              <a:t> - </a:t>
-            </a:r>
-            <a:r>
-              <a:rPr lang="en-US" dirty="0" err="1" smtClean="0"/>
-              <a:t>TreeView</a:t>
+              <a:t>Modifiers</a:t>
             </a:r>
             <a:endParaRPr lang="ru-RU" dirty="0"/>
           </a:p>
@@ -5470,7 +6056,7 @@
     </p:spTree>
     <p:extLst>
       <p:ext uri="{BB962C8B-B14F-4D97-AF65-F5344CB8AC3E}">
-        <p14:creationId xmlns:p14="http://schemas.microsoft.com/office/powerpoint/2010/main" val="3616111561"/>
+        <p14:creationId xmlns:p14="http://schemas.microsoft.com/office/powerpoint/2010/main" val="3812283606"/>
       </p:ext>
     </p:extLst>
   </p:cSld>

</xml_diff>

<commit_message>
Added link to FastColoredTextBox
</commit_message>
<xml_diff>
--- a/Presentation/lesson-12-winforms.pptx
+++ b/Presentation/lesson-12-winforms.pptx
@@ -5,7 +5,7 @@
     <p:sldMasterId id="2147483648" r:id="rId1"/>
   </p:sldMasterIdLst>
   <p:notesMasterIdLst>
-    <p:notesMasterId r:id="rId18"/>
+    <p:notesMasterId r:id="rId20"/>
   </p:notesMasterIdLst>
   <p:sldIdLst>
     <p:sldId id="256" r:id="rId2"/>
@@ -24,6 +24,8 @@
     <p:sldId id="288" r:id="rId15"/>
     <p:sldId id="284" r:id="rId16"/>
     <p:sldId id="285" r:id="rId17"/>
+    <p:sldId id="293" r:id="rId18"/>
+    <p:sldId id="294" r:id="rId19"/>
   </p:sldIdLst>
   <p:sldSz cx="9144000" cy="6858000" type="screen4x3"/>
   <p:notesSz cx="6858000" cy="9144000"/>
@@ -207,7 +209,7 @@
           <a:p>
             <a:fld id="{B24A7054-7FFB-49F4-A126-5DF6E687FF53}" type="datetimeFigureOut">
               <a:rPr lang="ru-RU" smtClean="0"/>
-              <a:t>20.12.2015</a:t>
+              <a:t>10.05.2016</a:t>
             </a:fld>
             <a:endParaRPr lang="ru-RU"/>
           </a:p>
@@ -1270,7 +1272,7 @@
           <a:p>
             <a:fld id="{8E6E6A2A-E9D3-4A0D-B04A-ABDD367A1E08}" type="datetimeFigureOut">
               <a:rPr lang="ru-RU" smtClean="0"/>
-              <a:t>20.12.2015</a:t>
+              <a:t>10.05.2016</a:t>
             </a:fld>
             <a:endParaRPr lang="ru-RU"/>
           </a:p>
@@ -2718,7 +2720,7 @@
           <a:p>
             <a:fld id="{AC3D3127-B7C4-45E3-9797-C527EC9FDD78}" type="datetimeFigureOut">
               <a:rPr lang="ru-RU" smtClean="0"/>
-              <a:t>20.12.2015</a:t>
+              <a:t>10.05.2016</a:t>
             </a:fld>
             <a:endParaRPr lang="ru-RU"/>
           </a:p>
@@ -4197,6 +4199,191 @@
 </p:sld>
 </file>
 
+<file path=ppt/slides/slide17.xml><?xml version="1.0" encoding="utf-8"?>
+<p:sld xmlns:a="http://schemas.openxmlformats.org/drawingml/2006/main" xmlns:r="http://schemas.openxmlformats.org/officeDocument/2006/relationships" xmlns:p="http://schemas.openxmlformats.org/presentationml/2006/main">
+  <p:cSld>
+    <p:spTree>
+      <p:nvGrpSpPr>
+        <p:cNvPr id="1" name=""/>
+        <p:cNvGrpSpPr/>
+        <p:nvPr/>
+      </p:nvGrpSpPr>
+      <p:grpSpPr>
+        <a:xfrm>
+          <a:off x="0" y="0"/>
+          <a:ext cx="0" cy="0"/>
+          <a:chOff x="0" y="0"/>
+          <a:chExt cx="0" cy="0"/>
+        </a:xfrm>
+      </p:grpSpPr>
+      <p:sp>
+        <p:nvSpPr>
+          <p:cNvPr id="4" name="Title 3"/>
+          <p:cNvSpPr>
+            <a:spLocks noGrp="1"/>
+          </p:cNvSpPr>
+          <p:nvPr>
+            <p:ph type="title"/>
+          </p:nvPr>
+        </p:nvSpPr>
+        <p:spPr/>
+        <p:txBody>
+          <a:bodyPr/>
+          <a:lstStyle/>
+          <a:p>
+            <a:r>
+              <a:rPr lang="ru-RU" dirty="0" smtClean="0"/>
+              <a:t>Полезные библиотеки</a:t>
+            </a:r>
+            <a:endParaRPr lang="ru-RU" dirty="0"/>
+          </a:p>
+        </p:txBody>
+      </p:sp>
+      <p:sp>
+        <p:nvSpPr>
+          <p:cNvPr id="5" name="Text Placeholder 4"/>
+          <p:cNvSpPr>
+            <a:spLocks noGrp="1"/>
+          </p:cNvSpPr>
+          <p:nvPr>
+            <p:ph type="body" idx="1"/>
+          </p:nvPr>
+        </p:nvSpPr>
+        <p:spPr/>
+        <p:txBody>
+          <a:bodyPr/>
+          <a:lstStyle/>
+          <a:p>
+            <a:endParaRPr lang="ru-RU" dirty="0"/>
+          </a:p>
+        </p:txBody>
+      </p:sp>
+    </p:spTree>
+    <p:extLst>
+      <p:ext uri="{BB962C8B-B14F-4D97-AF65-F5344CB8AC3E}">
+        <p14:creationId xmlns:p14="http://schemas.microsoft.com/office/powerpoint/2010/main" val="2756578197"/>
+      </p:ext>
+    </p:extLst>
+  </p:cSld>
+  <p:clrMapOvr>
+    <a:masterClrMapping/>
+  </p:clrMapOvr>
+</p:sld>
+</file>
+
+<file path=ppt/slides/slide18.xml><?xml version="1.0" encoding="utf-8"?>
+<p:sld xmlns:a="http://schemas.openxmlformats.org/drawingml/2006/main" xmlns:r="http://schemas.openxmlformats.org/officeDocument/2006/relationships" xmlns:p="http://schemas.openxmlformats.org/presentationml/2006/main">
+  <p:cSld>
+    <p:spTree>
+      <p:nvGrpSpPr>
+        <p:cNvPr id="1" name=""/>
+        <p:cNvGrpSpPr/>
+        <p:nvPr/>
+      </p:nvGrpSpPr>
+      <p:grpSpPr>
+        <a:xfrm>
+          <a:off x="0" y="0"/>
+          <a:ext cx="0" cy="0"/>
+          <a:chOff x="0" y="0"/>
+          <a:chExt cx="0" cy="0"/>
+        </a:xfrm>
+      </p:grpSpPr>
+      <p:sp>
+        <p:nvSpPr>
+          <p:cNvPr id="2" name="Title 1"/>
+          <p:cNvSpPr>
+            <a:spLocks noGrp="1"/>
+          </p:cNvSpPr>
+          <p:nvPr>
+            <p:ph type="title"/>
+          </p:nvPr>
+        </p:nvSpPr>
+        <p:spPr/>
+        <p:txBody>
+          <a:bodyPr/>
+          <a:lstStyle/>
+          <a:p>
+            <a:r>
+              <a:rPr lang="ru-RU" dirty="0" smtClean="0"/>
+              <a:t>Элементы управления</a:t>
+            </a:r>
+            <a:endParaRPr lang="ru-RU" dirty="0"/>
+          </a:p>
+        </p:txBody>
+      </p:sp>
+      <p:sp>
+        <p:nvSpPr>
+          <p:cNvPr id="3" name="Content Placeholder 2"/>
+          <p:cNvSpPr>
+            <a:spLocks noGrp="1"/>
+          </p:cNvSpPr>
+          <p:nvPr>
+            <p:ph idx="1"/>
+          </p:nvPr>
+        </p:nvSpPr>
+        <p:spPr/>
+        <p:txBody>
+          <a:bodyPr/>
+          <a:lstStyle/>
+          <a:p>
+            <a:r>
+              <a:rPr lang="en-US" dirty="0" err="1" smtClean="0">
+                <a:solidFill>
+                  <a:srgbClr val="FFFF00"/>
+                </a:solidFill>
+              </a:rPr>
+              <a:t>FastColoredTextBox</a:t>
+            </a:r>
+            <a:r>
+              <a:rPr lang="ru-RU" dirty="0" smtClean="0"/>
+              <a:t>: </a:t>
+            </a:r>
+            <a:r>
+              <a:rPr lang="en-US" dirty="0" smtClean="0"/>
+              <a:t>textbox </a:t>
+            </a:r>
+            <a:r>
+              <a:rPr lang="ru-RU" dirty="0" smtClean="0"/>
+              <a:t>с подсветкой синтаксиса</a:t>
+            </a:r>
+            <a:br>
+              <a:rPr lang="ru-RU" dirty="0" smtClean="0"/>
+            </a:br>
+            <a:r>
+              <a:rPr lang="en-US" dirty="0">
+                <a:hlinkClick r:id="rId2"/>
+              </a:rPr>
+              <a:t>https://</a:t>
+            </a:r>
+            <a:r>
+              <a:rPr lang="en-US" dirty="0" smtClean="0">
+                <a:hlinkClick r:id="rId2"/>
+              </a:rPr>
+              <a:t>www.nuget.org/packages/FCTB/</a:t>
+            </a:r>
+            <a:endParaRPr lang="ru-RU" smtClean="0"/>
+          </a:p>
+          <a:p>
+            <a:endParaRPr lang="ru-RU" dirty="0" smtClean="0"/>
+          </a:p>
+          <a:p>
+            <a:endParaRPr lang="ru-RU" dirty="0"/>
+          </a:p>
+        </p:txBody>
+      </p:sp>
+    </p:spTree>
+    <p:extLst>
+      <p:ext uri="{BB962C8B-B14F-4D97-AF65-F5344CB8AC3E}">
+        <p14:creationId xmlns:p14="http://schemas.microsoft.com/office/powerpoint/2010/main" val="2217456043"/>
+      </p:ext>
+    </p:extLst>
+  </p:cSld>
+  <p:clrMapOvr>
+    <a:masterClrMapping/>
+  </p:clrMapOvr>
+</p:sld>
+</file>
+
 <file path=ppt/slides/slide2.xml><?xml version="1.0" encoding="utf-8"?>
 <p:sld xmlns:a="http://schemas.openxmlformats.org/drawingml/2006/main" xmlns:r="http://schemas.openxmlformats.org/officeDocument/2006/relationships" xmlns:p="http://schemas.openxmlformats.org/presentationml/2006/main" show="0">
   <p:cSld>
@@ -4273,11 +4460,11 @@
   <p:clrMapOvr>
     <a:masterClrMapping/>
   </p:clrMapOvr>
-  <mc:AlternateContent xmlns:mc="http://schemas.openxmlformats.org/markup-compatibility/2006">
-    <mc:Choice xmlns:p14="http://schemas.microsoft.com/office/powerpoint/2010/main" Requires="p14">
+  <mc:AlternateContent xmlns:mc="http://schemas.openxmlformats.org/markup-compatibility/2006" xmlns:p14="http://schemas.microsoft.com/office/powerpoint/2010/main">
+    <mc:Choice Requires="p14">
       <p:transition spd="slow" p14:dur="2000"/>
     </mc:Choice>
-    <mc:Fallback>
+    <mc:Fallback xmlns="">
       <p:transition spd="slow"/>
     </mc:Fallback>
   </mc:AlternateContent>

</xml_diff>